<commit_message>
fixed pom and added run scripts.
</commit_message>
<xml_diff>
--- a/jug-quartz/JUG-QuartzScheduler.pptx
+++ b/jug-quartz/JUG-QuartzScheduler.pptx
@@ -5,7 +5,7 @@
     <p:sldMasterId id="2147483648" r:id="rId1"/>
   </p:sldMasterIdLst>
   <p:notesMasterIdLst>
-    <p:notesMasterId r:id="rId15"/>
+    <p:notesMasterId r:id="rId16"/>
   </p:notesMasterIdLst>
   <p:sldIdLst>
     <p:sldId id="256" r:id="rId2"/>
@@ -16,11 +16,12 @@
     <p:sldId id="293" r:id="rId7"/>
     <p:sldId id="294" r:id="rId8"/>
     <p:sldId id="295" r:id="rId9"/>
-    <p:sldId id="289" r:id="rId10"/>
-    <p:sldId id="274" r:id="rId11"/>
-    <p:sldId id="296" r:id="rId12"/>
-    <p:sldId id="297" r:id="rId13"/>
-    <p:sldId id="263" r:id="rId14"/>
+    <p:sldId id="298" r:id="rId10"/>
+    <p:sldId id="289" r:id="rId11"/>
+    <p:sldId id="274" r:id="rId12"/>
+    <p:sldId id="296" r:id="rId13"/>
+    <p:sldId id="297" r:id="rId14"/>
+    <p:sldId id="263" r:id="rId15"/>
   </p:sldIdLst>
   <p:sldSz cx="9144000" cy="6858000" type="screen4x3"/>
   <p:notesSz cx="6858000" cy="9144000"/>
@@ -205,7 +206,7 @@
             <a:fld id="{8AB11769-0C79-44AF-972A-3F5B927E1D64}" type="datetimeFigureOut">
               <a:rPr lang="en-US" smtClean="0"/>
               <a:pPr/>
-              <a:t>04/26/2011</a:t>
+              <a:t>04/28/2011</a:t>
             </a:fld>
             <a:endParaRPr lang="en-US"/>
           </a:p>
@@ -653,7 +654,7 @@
             <a:fld id="{3796407A-8687-4B8F-91F1-3AC1438651FB}" type="datetime1">
               <a:rPr lang="en-US" smtClean="0"/>
               <a:pPr/>
-              <a:t>04/26/2011</a:t>
+              <a:t>04/28/2011</a:t>
             </a:fld>
             <a:endParaRPr lang="en-US"/>
           </a:p>
@@ -820,7 +821,7 @@
             <a:fld id="{E5D373EA-8CA6-4B9B-9005-D717EF56EED0}" type="datetime1">
               <a:rPr lang="en-US" smtClean="0"/>
               <a:pPr/>
-              <a:t>04/26/2011</a:t>
+              <a:t>04/28/2011</a:t>
             </a:fld>
             <a:endParaRPr lang="en-US"/>
           </a:p>
@@ -997,7 +998,7 @@
             <a:fld id="{CF93068E-8064-4FF6-84D5-DB3803DB548E}" type="datetime1">
               <a:rPr lang="en-US" smtClean="0"/>
               <a:pPr/>
-              <a:t>04/26/2011</a:t>
+              <a:t>04/28/2011</a:t>
             </a:fld>
             <a:endParaRPr lang="en-US"/>
           </a:p>
@@ -1164,7 +1165,7 @@
             <a:fld id="{04D0F31D-9398-49EF-B43D-5AB5D9EC9D79}" type="datetime1">
               <a:rPr lang="en-US" smtClean="0"/>
               <a:pPr/>
-              <a:t>04/26/2011</a:t>
+              <a:t>04/28/2011</a:t>
             </a:fld>
             <a:endParaRPr lang="en-US"/>
           </a:p>
@@ -1407,7 +1408,7 @@
             <a:fld id="{2541B562-DB49-478B-9024-3A2F560D2B45}" type="datetime1">
               <a:rPr lang="en-US" smtClean="0"/>
               <a:pPr/>
-              <a:t>04/26/2011</a:t>
+              <a:t>04/28/2011</a:t>
             </a:fld>
             <a:endParaRPr lang="en-US"/>
           </a:p>
@@ -1692,7 +1693,7 @@
             <a:fld id="{C19490BC-31BD-41A3-A766-9A4E2E48CCA6}" type="datetime1">
               <a:rPr lang="en-US" smtClean="0"/>
               <a:pPr/>
-              <a:t>04/26/2011</a:t>
+              <a:t>04/28/2011</a:t>
             </a:fld>
             <a:endParaRPr lang="en-US"/>
           </a:p>
@@ -2111,7 +2112,7 @@
             <a:fld id="{A405D5C5-86E5-45B4-B053-E8D2C54A68DB}" type="datetime1">
               <a:rPr lang="en-US" smtClean="0"/>
               <a:pPr/>
-              <a:t>04/26/2011</a:t>
+              <a:t>04/28/2011</a:t>
             </a:fld>
             <a:endParaRPr lang="en-US"/>
           </a:p>
@@ -2226,7 +2227,7 @@
             <a:fld id="{C07B2446-96F0-44EF-846E-EFDA9C18662A}" type="datetime1">
               <a:rPr lang="en-US" smtClean="0"/>
               <a:pPr/>
-              <a:t>04/26/2011</a:t>
+              <a:t>04/28/2011</a:t>
             </a:fld>
             <a:endParaRPr lang="en-US"/>
           </a:p>
@@ -2318,7 +2319,7 @@
             <a:fld id="{109D3FB2-2BEE-4EB1-A67F-5819A21CEA98}" type="datetime1">
               <a:rPr lang="en-US" smtClean="0"/>
               <a:pPr/>
-              <a:t>04/26/2011</a:t>
+              <a:t>04/28/2011</a:t>
             </a:fld>
             <a:endParaRPr lang="en-US"/>
           </a:p>
@@ -2592,7 +2593,7 @@
             <a:fld id="{4742629B-6F0B-4137-9387-BA5E63C3590B}" type="datetime1">
               <a:rPr lang="en-US" smtClean="0"/>
               <a:pPr/>
-              <a:t>04/26/2011</a:t>
+              <a:t>04/28/2011</a:t>
             </a:fld>
             <a:endParaRPr lang="en-US"/>
           </a:p>
@@ -2842,7 +2843,7 @@
             <a:fld id="{4630A119-7BA1-4517-80A6-CAB5B4E035B4}" type="datetime1">
               <a:rPr lang="en-US" smtClean="0"/>
               <a:pPr/>
-              <a:t>04/26/2011</a:t>
+              <a:t>04/28/2011</a:t>
             </a:fld>
             <a:endParaRPr lang="en-US"/>
           </a:p>
@@ -3052,7 +3053,7 @@
             <a:fld id="{F554EC9A-6C8D-49D6-A5DB-D993F2740181}" type="datetime1">
               <a:rPr lang="en-US" smtClean="0"/>
               <a:pPr/>
-              <a:t>04/26/2011</a:t>
+              <a:t>04/28/2011</a:t>
             </a:fld>
             <a:endParaRPr lang="en-US"/>
           </a:p>
@@ -3602,110 +3603,33 @@
           </a:bodyPr>
           <a:lstStyle/>
           <a:p>
-            <a:pPr lvl="1" algn="ctr">
-              <a:buNone/>
-            </a:pPr>
-            <a:r>
-              <a:rPr lang="en-US" dirty="0" smtClean="0"/>
-              <a:t>Tired of </a:t>
-            </a:r>
-            <a:r>
-              <a:rPr lang="en-US" dirty="0" err="1" smtClean="0">
-                <a:solidFill>
-                  <a:srgbClr val="FF0000"/>
-                </a:solidFill>
-              </a:rPr>
-              <a:t>java.util.Calendar</a:t>
-            </a:r>
-            <a:r>
-              <a:rPr lang="en-US" dirty="0" smtClean="0">
-                <a:solidFill>
-                  <a:srgbClr val="FF0000"/>
-                </a:solidFill>
-              </a:rPr>
-              <a:t> </a:t>
-            </a:r>
-            <a:r>
-              <a:rPr lang="en-US" dirty="0" smtClean="0"/>
-              <a:t>&amp; </a:t>
-            </a:r>
-            <a:r>
-              <a:rPr lang="en-US" dirty="0" err="1" smtClean="0">
-                <a:solidFill>
-                  <a:srgbClr val="FF0000"/>
-                </a:solidFill>
-              </a:rPr>
-              <a:t>java.util.Date</a:t>
-            </a:r>
-            <a:r>
-              <a:rPr lang="en-US" dirty="0" smtClean="0">
-                <a:solidFill>
-                  <a:srgbClr val="FF0000"/>
-                </a:solidFill>
-              </a:rPr>
-              <a:t>?</a:t>
-            </a:r>
-          </a:p>
-          <a:p>
-            <a:pPr lvl="1" algn="ctr">
-              <a:buNone/>
-            </a:pPr>
-            <a:endParaRPr lang="en-US" dirty="0" smtClean="0"/>
-          </a:p>
-          <a:p>
-            <a:pPr lvl="1" algn="ctr">
-              <a:buNone/>
-            </a:pPr>
-            <a:r>
-              <a:rPr lang="en-US" dirty="0" smtClean="0"/>
-              <a:t>Use </a:t>
+            <a:r>
+              <a:rPr lang="en-US" dirty="0" smtClean="0"/>
+              <a:t>Quartz </a:t>
             </a:r>
             <a:r>
               <a:rPr lang="en-US" dirty="0" err="1" smtClean="0"/>
-              <a:t>org.quartz.</a:t>
-            </a:r>
-            <a:r>
-              <a:rPr lang="en-US" dirty="0" err="1" smtClean="0">
-                <a:solidFill>
-                  <a:srgbClr val="00B050"/>
-                </a:solidFill>
-              </a:rPr>
-              <a:t>TriggerUtils</a:t>
-            </a:r>
-            <a:r>
-              <a:rPr lang="en-US" dirty="0" smtClean="0"/>
-              <a:t> or</a:t>
-            </a:r>
-          </a:p>
-          <a:p>
-            <a:pPr lvl="1" algn="ctr">
-              <a:buNone/>
-            </a:pPr>
-            <a:r>
-              <a:rPr lang="en-US" dirty="0" smtClean="0"/>
-              <a:t>Apache commons-</a:t>
+              <a:t>Cron</a:t>
+            </a:r>
+            <a:r>
+              <a:rPr lang="en-US" dirty="0" smtClean="0"/>
+              <a:t> Expression has 6 fields (down to seconds) + 1 optional year field.</a:t>
+            </a:r>
+          </a:p>
+          <a:p>
+            <a:r>
+              <a:rPr lang="en-US" dirty="0" smtClean="0"/>
+              <a:t>Typical Unix/Linux </a:t>
             </a:r>
             <a:r>
               <a:rPr lang="en-US" dirty="0" err="1" smtClean="0"/>
-              <a:t>langs</a:t>
-            </a:r>
-            <a:r>
-              <a:rPr lang="en-US" dirty="0" smtClean="0"/>
-              <a:t> </a:t>
-            </a:r>
-            <a:r>
-              <a:rPr lang="en-US" dirty="0" err="1" smtClean="0">
-                <a:solidFill>
-                  <a:srgbClr val="00B050"/>
-                </a:solidFill>
-              </a:rPr>
-              <a:t>DateUtils</a:t>
-            </a:r>
-            <a:endParaRPr lang="en-US" dirty="0" smtClean="0">
-              <a:solidFill>
-                <a:srgbClr val="FF0000"/>
-              </a:solidFill>
-            </a:endParaRPr>
+              <a:t>Cron</a:t>
+            </a:r>
+            <a:r>
+              <a:rPr lang="en-US" dirty="0" smtClean="0"/>
+              <a:t> expression has only 5 fields (down to mins only!)</a:t>
+            </a:r>
+            <a:endParaRPr lang="en-US" dirty="0"/>
           </a:p>
         </p:txBody>
       </p:sp>
@@ -3804,53 +3728,115 @@
         </p:nvSpPr>
         <p:spPr/>
         <p:txBody>
-          <a:bodyPr anchor="t">
+          <a:bodyPr anchor="ctr">
             <a:normAutofit/>
           </a:bodyPr>
           <a:lstStyle/>
           <a:p>
-            <a:pPr lvl="1">
+            <a:pPr lvl="1" algn="ctr">
               <a:buNone/>
             </a:pPr>
             <a:r>
               <a:rPr lang="en-US" dirty="0" smtClean="0"/>
-              <a:t>Spring Quartz Scheduler</a:t>
-            </a:r>
-          </a:p>
-          <a:p>
-            <a:pPr lvl="1"/>
-            <a:r>
-              <a:rPr lang="en-US" dirty="0" smtClean="0"/>
-              <a:t>You can’t disable auto shutdown!</a:t>
+              <a:t>Tired of </a:t>
+            </a:r>
+            <a:r>
+              <a:rPr lang="en-US" dirty="0" err="1" smtClean="0">
+                <a:solidFill>
+                  <a:srgbClr val="FF0000"/>
+                </a:solidFill>
+              </a:rPr>
+              <a:t>java.util.Calendar</a:t>
+            </a:r>
+            <a:r>
+              <a:rPr lang="en-US" dirty="0" smtClean="0">
+                <a:solidFill>
+                  <a:srgbClr val="FF0000"/>
+                </a:solidFill>
+              </a:rPr>
+              <a:t> </a:t>
+            </a:r>
+            <a:r>
+              <a:rPr lang="en-US" dirty="0" smtClean="0"/>
+              <a:t>&amp; </a:t>
+            </a:r>
+            <a:r>
+              <a:rPr lang="en-US" dirty="0" err="1" smtClean="0">
+                <a:solidFill>
+                  <a:srgbClr val="FF0000"/>
+                </a:solidFill>
+              </a:rPr>
+              <a:t>java.util.Date</a:t>
+            </a:r>
+            <a:r>
+              <a:rPr lang="en-US" dirty="0" smtClean="0">
+                <a:solidFill>
+                  <a:srgbClr val="FF0000"/>
+                </a:solidFill>
+              </a:rPr>
+              <a:t>?</a:t>
+            </a:r>
+          </a:p>
+          <a:p>
+            <a:pPr lvl="1" algn="ctr">
+              <a:buNone/>
+            </a:pPr>
+            <a:endParaRPr lang="en-US" dirty="0" smtClean="0"/>
+          </a:p>
+          <a:p>
+            <a:pPr lvl="1" algn="ctr">
+              <a:buNone/>
+            </a:pPr>
+            <a:r>
+              <a:rPr lang="en-US" dirty="0" smtClean="0"/>
+              <a:t>Use </a:t>
+            </a:r>
+            <a:r>
+              <a:rPr lang="en-US" dirty="0" err="1" smtClean="0"/>
+              <a:t>org.quartz.</a:t>
+            </a:r>
+            <a:r>
+              <a:rPr lang="en-US" dirty="0" err="1" smtClean="0">
+                <a:solidFill>
+                  <a:srgbClr val="00B050"/>
+                </a:solidFill>
+              </a:rPr>
+              <a:t>TriggerUtils</a:t>
+            </a:r>
+            <a:r>
+              <a:rPr lang="en-US" dirty="0" smtClean="0"/>
+              <a:t> or</a:t>
+            </a:r>
+          </a:p>
+          <a:p>
+            <a:pPr lvl="1" algn="ctr">
+              <a:buNone/>
+            </a:pPr>
+            <a:r>
+              <a:rPr lang="en-US" dirty="0" smtClean="0"/>
+              <a:t>Apache commons-</a:t>
+            </a:r>
+            <a:r>
+              <a:rPr lang="en-US" dirty="0" err="1" smtClean="0"/>
+              <a:t>langs</a:t>
+            </a:r>
+            <a:r>
+              <a:rPr lang="en-US" dirty="0" smtClean="0"/>
+              <a:t> </a:t>
+            </a:r>
+            <a:r>
+              <a:rPr lang="en-US" dirty="0" err="1" smtClean="0">
+                <a:solidFill>
+                  <a:srgbClr val="00B050"/>
+                </a:solidFill>
+              </a:rPr>
+              <a:t>DateUtils</a:t>
             </a:r>
             <a:endParaRPr lang="en-US" dirty="0" smtClean="0">
               <a:solidFill>
                 <a:srgbClr val="FF0000"/>
               </a:solidFill>
             </a:endParaRPr>
-          </a:p>
-          <a:p>
-            <a:pPr lvl="1"/>
-            <a:r>
-              <a:rPr lang="en-US" dirty="0" smtClean="0"/>
-              <a:t>Usage of </a:t>
-            </a:r>
-            <a:r>
-              <a:rPr lang="en-US" dirty="0" err="1" smtClean="0"/>
-              <a:t>dataSource</a:t>
-            </a:r>
-            <a:r>
-              <a:rPr lang="en-US" dirty="0" smtClean="0"/>
-              <a:t> force to use </a:t>
-            </a:r>
-            <a:r>
-              <a:rPr lang="en-US" dirty="0" err="1" smtClean="0"/>
-              <a:t>DBTable</a:t>
-            </a:r>
-            <a:r>
-              <a:rPr lang="en-US" dirty="0" smtClean="0"/>
-              <a:t> locks.</a:t>
-            </a:r>
           </a:p>
         </p:txBody>
       </p:sp>
@@ -3949,32 +3935,53 @@
         </p:nvSpPr>
         <p:spPr/>
         <p:txBody>
-          <a:bodyPr anchor="ctr">
+          <a:bodyPr anchor="t">
             <a:normAutofit/>
           </a:bodyPr>
           <a:lstStyle/>
           <a:p>
-            <a:pPr lvl="1" algn="ctr">
+            <a:pPr lvl="1">
               <a:buNone/>
             </a:pPr>
             <a:r>
               <a:rPr lang="en-US" dirty="0" smtClean="0"/>
-              <a:t>When using RMI server mode, there is a bug that can crash your scheduler:</a:t>
-            </a:r>
-          </a:p>
-          <a:p>
-            <a:pPr lvl="1" algn="ctr">
-              <a:buNone/>
-            </a:pPr>
-            <a:r>
-              <a:rPr lang="en-US" dirty="0" smtClean="0"/>
-              <a:t>http</a:t>
-            </a:r>
-            <a:r>
-              <a:rPr lang="en-US" dirty="0" smtClean="0"/>
-              <a:t>://jira.terracotta.org/jira/browse/QTZ-135</a:t>
-            </a:r>
-            <a:endParaRPr lang="en-US" dirty="0" smtClean="0"/>
+              <a:t>Spring Quartz Scheduler</a:t>
+            </a:r>
+          </a:p>
+          <a:p>
+            <a:pPr lvl="1"/>
+            <a:r>
+              <a:rPr lang="en-US" dirty="0" smtClean="0"/>
+              <a:t>You can’t disable auto shutdown!</a:t>
+            </a:r>
+            <a:endParaRPr lang="en-US" dirty="0" smtClean="0">
+              <a:solidFill>
+                <a:srgbClr val="FF0000"/>
+              </a:solidFill>
+            </a:endParaRPr>
+          </a:p>
+          <a:p>
+            <a:pPr lvl="1"/>
+            <a:r>
+              <a:rPr lang="en-US" dirty="0" smtClean="0"/>
+              <a:t>Usage of </a:t>
+            </a:r>
+            <a:r>
+              <a:rPr lang="en-US" dirty="0" err="1" smtClean="0"/>
+              <a:t>dataSource</a:t>
+            </a:r>
+            <a:r>
+              <a:rPr lang="en-US" dirty="0" smtClean="0"/>
+              <a:t> force to use </a:t>
+            </a:r>
+            <a:r>
+              <a:rPr lang="en-US" dirty="0" err="1" smtClean="0"/>
+              <a:t>DBTable</a:t>
+            </a:r>
+            <a:r>
+              <a:rPr lang="en-US" dirty="0" smtClean="0"/>
+              <a:t> locks.</a:t>
+            </a:r>
           </a:p>
         </p:txBody>
       </p:sp>
@@ -4036,22 +4043,30 @@
       </p:grpSpPr>
       <p:sp>
         <p:nvSpPr>
-          <p:cNvPr id="4" name="Title 3"/>
-          <p:cNvSpPr>
-            <a:spLocks noGrp="1"/>
-          </p:cNvSpPr>
-          <p:nvPr>
-            <p:ph type="ctrTitle"/>
-          </p:nvPr>
-        </p:nvSpPr>
-        <p:spPr/>
-        <p:txBody>
-          <a:bodyPr/>
-          <a:lstStyle/>
-          <a:p>
-            <a:r>
-              <a:rPr lang="en-US" dirty="0" smtClean="0"/>
-              <a:t>Questions?</a:t>
+          <p:cNvPr id="2" name="Title 1"/>
+          <p:cNvSpPr>
+            <a:spLocks noGrp="1"/>
+          </p:cNvSpPr>
+          <p:nvPr>
+            <p:ph type="title"/>
+          </p:nvPr>
+        </p:nvSpPr>
+        <p:spPr/>
+        <p:txBody>
+          <a:bodyPr/>
+          <a:lstStyle/>
+          <a:p>
+            <a:r>
+              <a:rPr lang="en-US" dirty="0" smtClean="0"/>
+              <a:t>Scheduler Tips </a:t>
+            </a:r>
+            <a:r>
+              <a:rPr lang="en-US" dirty="0" smtClean="0"/>
+              <a:t>#</a:t>
+            </a:r>
+            <a:r>
+              <a:rPr lang="en-US" dirty="0" smtClean="0"/>
+              <a:t>5</a:t>
             </a:r>
             <a:endParaRPr lang="en-US" dirty="0"/>
           </a:p>
@@ -4059,7 +4074,43 @@
       </p:sp>
       <p:sp>
         <p:nvSpPr>
-          <p:cNvPr id="3" name="Slide Number Placeholder 2"/>
+          <p:cNvPr id="3" name="Content Placeholder 2"/>
+          <p:cNvSpPr>
+            <a:spLocks noGrp="1"/>
+          </p:cNvSpPr>
+          <p:nvPr>
+            <p:ph idx="1"/>
+          </p:nvPr>
+        </p:nvSpPr>
+        <p:spPr/>
+        <p:txBody>
+          <a:bodyPr anchor="ctr">
+            <a:normAutofit/>
+          </a:bodyPr>
+          <a:lstStyle/>
+          <a:p>
+            <a:pPr lvl="1" algn="ctr">
+              <a:buNone/>
+            </a:pPr>
+            <a:r>
+              <a:rPr lang="en-US" dirty="0" smtClean="0"/>
+              <a:t>When using RMI server mode, there is a bug that can crash your scheduler:</a:t>
+            </a:r>
+          </a:p>
+          <a:p>
+            <a:pPr lvl="1" algn="ctr">
+              <a:buNone/>
+            </a:pPr>
+            <a:r>
+              <a:rPr lang="en-US" dirty="0" smtClean="0"/>
+              <a:t>http://jira.terracotta.org/jira/browse/QTZ-135</a:t>
+            </a:r>
+          </a:p>
+        </p:txBody>
+      </p:sp>
+      <p:sp>
+        <p:nvSpPr>
+          <p:cNvPr id="4" name="Slide Number Placeholder 3"/>
           <p:cNvSpPr>
             <a:spLocks noGrp="1"/>
           </p:cNvSpPr>
@@ -4076,6 +4127,85 @@
               <a:rPr lang="en-US" smtClean="0"/>
               <a:pPr/>
               <a:t>13</a:t>
+            </a:fld>
+            <a:endParaRPr lang="en-US"/>
+          </a:p>
+        </p:txBody>
+      </p:sp>
+    </p:spTree>
+  </p:cSld>
+  <p:clrMapOvr>
+    <a:masterClrMapping/>
+  </p:clrMapOvr>
+  <p:timing>
+    <p:tnLst>
+      <p:par>
+        <p:cTn id="1" dur="indefinite" restart="never" nodeType="tmRoot"/>
+      </p:par>
+    </p:tnLst>
+  </p:timing>
+</p:sld>
+</file>
+
+<file path=ppt/slides/slide14.xml><?xml version="1.0" encoding="utf-8"?>
+<p:sld xmlns:a="http://schemas.openxmlformats.org/drawingml/2006/main" xmlns:r="http://schemas.openxmlformats.org/officeDocument/2006/relationships" xmlns:p="http://schemas.openxmlformats.org/presentationml/2006/main">
+  <p:cSld>
+    <p:spTree>
+      <p:nvGrpSpPr>
+        <p:cNvPr id="1" name=""/>
+        <p:cNvGrpSpPr/>
+        <p:nvPr/>
+      </p:nvGrpSpPr>
+      <p:grpSpPr>
+        <a:xfrm>
+          <a:off x="0" y="0"/>
+          <a:ext cx="0" cy="0"/>
+          <a:chOff x="0" y="0"/>
+          <a:chExt cx="0" cy="0"/>
+        </a:xfrm>
+      </p:grpSpPr>
+      <p:sp>
+        <p:nvSpPr>
+          <p:cNvPr id="4" name="Title 3"/>
+          <p:cNvSpPr>
+            <a:spLocks noGrp="1"/>
+          </p:cNvSpPr>
+          <p:nvPr>
+            <p:ph type="ctrTitle"/>
+          </p:nvPr>
+        </p:nvSpPr>
+        <p:spPr/>
+        <p:txBody>
+          <a:bodyPr/>
+          <a:lstStyle/>
+          <a:p>
+            <a:r>
+              <a:rPr lang="en-US" dirty="0" smtClean="0"/>
+              <a:t>Questions?</a:t>
+            </a:r>
+            <a:endParaRPr lang="en-US" dirty="0"/>
+          </a:p>
+        </p:txBody>
+      </p:sp>
+      <p:sp>
+        <p:nvSpPr>
+          <p:cNvPr id="3" name="Slide Number Placeholder 2"/>
+          <p:cNvSpPr>
+            <a:spLocks noGrp="1"/>
+          </p:cNvSpPr>
+          <p:nvPr>
+            <p:ph type="sldNum" sz="quarter" idx="12"/>
+          </p:nvPr>
+        </p:nvSpPr>
+        <p:spPr/>
+        <p:txBody>
+          <a:bodyPr/>
+          <a:lstStyle/>
+          <a:p>
+            <a:fld id="{D122669F-2901-44A4-93DF-17D7DEF702D7}" type="slidenum">
+              <a:rPr lang="en-US" smtClean="0"/>
+              <a:pPr/>
+              <a:t>14</a:t>
             </a:fld>
             <a:endParaRPr lang="en-US"/>
           </a:p>
@@ -4570,11 +4700,7 @@
           <a:p>
             <a:r>
               <a:rPr lang="en-US" dirty="0" smtClean="0"/>
-              <a:t>Scheduling </a:t>
-            </a:r>
-            <a:r>
-              <a:rPr lang="en-US" dirty="0" smtClean="0"/>
-              <a:t>One Time Job</a:t>
+              <a:t>Scheduling One Time Job</a:t>
             </a:r>
             <a:endParaRPr lang="en-US" sz="3600" i="1" dirty="0"/>
           </a:p>
@@ -4758,14 +4884,7 @@
                 <a:latin typeface="Courier New" pitchFamily="49" charset="0"/>
                 <a:cs typeface="Courier New" pitchFamily="49" charset="0"/>
               </a:rPr>
-              <a:t>) throws Exception </a:t>
-            </a:r>
-            <a:r>
-              <a:rPr lang="en-US" sz="1500" dirty="0" smtClean="0">
-                <a:latin typeface="Courier New" pitchFamily="49" charset="0"/>
-                <a:cs typeface="Courier New" pitchFamily="49" charset="0"/>
-              </a:rPr>
-              <a:t>{</a:t>
+              <a:t>) throws Exception {</a:t>
             </a:r>
           </a:p>
           <a:p>
@@ -4943,14 +5062,7 @@
                 <a:latin typeface="Courier New" pitchFamily="49" charset="0"/>
                 <a:cs typeface="Courier New" pitchFamily="49" charset="0"/>
               </a:rPr>
-              <a:t>(job, trigger</a:t>
-            </a:r>
-            <a:r>
-              <a:rPr lang="en-US" sz="1500" dirty="0" smtClean="0">
-                <a:latin typeface="Courier New" pitchFamily="49" charset="0"/>
-                <a:cs typeface="Courier New" pitchFamily="49" charset="0"/>
-              </a:rPr>
-              <a:t>);</a:t>
+              <a:t>(job, trigger);</a:t>
             </a:r>
           </a:p>
           <a:p>
@@ -4997,14 +5109,7 @@
                 <a:latin typeface="Courier New" pitchFamily="49" charset="0"/>
                 <a:cs typeface="Courier New" pitchFamily="49" charset="0"/>
               </a:rPr>
-              <a:t> </a:t>
-            </a:r>
-            <a:r>
-              <a:rPr lang="en-US" sz="1500" dirty="0" smtClean="0">
-                <a:latin typeface="Courier New" pitchFamily="49" charset="0"/>
-                <a:cs typeface="Courier New" pitchFamily="49" charset="0"/>
-              </a:rPr>
-              <a:t>   </a:t>
+              <a:t>    </a:t>
             </a:r>
             <a:r>
               <a:rPr lang="en-US" sz="1500" dirty="0" err="1" smtClean="0">
@@ -5020,10 +5125,6 @@
               </a:rPr>
               <a:t>(3000L);</a:t>
             </a:r>
-            <a:endParaRPr lang="en-US" sz="1500" dirty="0" smtClean="0">
-              <a:latin typeface="Courier New" pitchFamily="49" charset="0"/>
-              <a:cs typeface="Courier New" pitchFamily="49" charset="0"/>
-            </a:endParaRPr>
           </a:p>
           <a:p>
             <a:pPr>
@@ -5126,15 +5227,7 @@
           <a:p>
             <a:r>
               <a:rPr lang="en-US" dirty="0" smtClean="0"/>
-              <a:t>More </a:t>
-            </a:r>
-            <a:r>
-              <a:rPr lang="en-US" dirty="0" smtClean="0"/>
-              <a:t>Scheduling </a:t>
-            </a:r>
-            <a:r>
-              <a:rPr lang="en-US" dirty="0" smtClean="0"/>
-              <a:t>Job Examples</a:t>
+              <a:t>More Scheduling Job Examples</a:t>
             </a:r>
             <a:endParaRPr lang="en-US" dirty="0"/>
           </a:p>
@@ -5305,27 +5398,100 @@
           <a:p>
             <a:r>
               <a:rPr lang="en-US" dirty="0" smtClean="0"/>
-              <a:t>In Memory Job Storage</a:t>
+              <a:t>In Memory Job </a:t>
+            </a:r>
+            <a:r>
+              <a:rPr lang="en-US" dirty="0" smtClean="0"/>
+              <a:t>Storage - </a:t>
+            </a:r>
+            <a:r>
+              <a:rPr lang="en-US" dirty="0" err="1" smtClean="0"/>
+              <a:t>RAMJobStore</a:t>
             </a:r>
             <a:endParaRPr lang="en-US" dirty="0" smtClean="0"/>
           </a:p>
           <a:p>
             <a:r>
               <a:rPr lang="en-US" dirty="0" smtClean="0"/>
-              <a:t>JDBC Job Storage</a:t>
+              <a:t>JDBC Job </a:t>
+            </a:r>
+            <a:r>
+              <a:rPr lang="en-US" dirty="0" smtClean="0"/>
+              <a:t>Storage - </a:t>
+            </a:r>
+            <a:r>
+              <a:rPr lang="en-US" dirty="0" err="1" smtClean="0"/>
+              <a:t>JobStoreTX</a:t>
             </a:r>
             <a:endParaRPr lang="en-US" dirty="0" smtClean="0"/>
           </a:p>
           <a:p>
             <a:r>
-              <a:rPr lang="en-US" dirty="0" smtClean="0"/>
-              <a:t>JTM JDBC Job Storage</a:t>
-            </a:r>
-          </a:p>
-          <a:p>
-            <a:r>
-              <a:rPr lang="en-US" dirty="0" smtClean="0"/>
-              <a:t>Spring JTM Job Storage</a:t>
+              <a:rPr lang="en-US" dirty="0" err="1" smtClean="0"/>
+              <a:t>T</a:t>
+            </a:r>
+            <a:r>
+              <a:rPr lang="en-US" dirty="0" err="1" smtClean="0"/>
+              <a:t>x</a:t>
+            </a:r>
+            <a:r>
+              <a:rPr lang="en-US" dirty="0" smtClean="0"/>
+              <a:t> </a:t>
+            </a:r>
+            <a:r>
+              <a:rPr lang="en-US" dirty="0" err="1" smtClean="0"/>
+              <a:t>DataSource</a:t>
+            </a:r>
+            <a:r>
+              <a:rPr lang="en-US" dirty="0" smtClean="0"/>
+              <a:t> </a:t>
+            </a:r>
+            <a:r>
+              <a:rPr lang="en-US" dirty="0" smtClean="0"/>
+              <a:t>Job </a:t>
+            </a:r>
+            <a:r>
+              <a:rPr lang="en-US" dirty="0" smtClean="0"/>
+              <a:t>Storage - </a:t>
+            </a:r>
+            <a:r>
+              <a:rPr lang="en-US" dirty="0" err="1" smtClean="0"/>
+              <a:t>JobStoreCMT</a:t>
+            </a:r>
+            <a:endParaRPr lang="en-US" dirty="0" smtClean="0"/>
+          </a:p>
+          <a:p>
+            <a:r>
+              <a:rPr lang="en-US" dirty="0" smtClean="0"/>
+              <a:t>Spring </a:t>
+            </a:r>
+            <a:r>
+              <a:rPr lang="en-US" dirty="0" err="1" smtClean="0"/>
+              <a:t>Tx</a:t>
+            </a:r>
+            <a:r>
+              <a:rPr lang="en-US" dirty="0" smtClean="0"/>
+              <a:t> </a:t>
+            </a:r>
+            <a:r>
+              <a:rPr lang="en-US" dirty="0" err="1" smtClean="0"/>
+              <a:t>DataSource</a:t>
+            </a:r>
+            <a:r>
+              <a:rPr lang="en-US" dirty="0" smtClean="0"/>
+              <a:t> </a:t>
+            </a:r>
+            <a:r>
+              <a:rPr lang="en-US" dirty="0" smtClean="0"/>
+              <a:t>Job </a:t>
+            </a:r>
+            <a:r>
+              <a:rPr lang="en-US" dirty="0" smtClean="0"/>
+              <a:t>Storage - </a:t>
+            </a:r>
+            <a:r>
+              <a:rPr lang="en-US" dirty="0" err="1" smtClean="0"/>
+              <a:t>LocalDataSourceJobStore</a:t>
             </a:r>
             <a:endParaRPr lang="en-US" dirty="0" smtClean="0"/>
           </a:p>
@@ -5404,11 +5570,7 @@
           <a:p>
             <a:r>
               <a:rPr lang="en-US" dirty="0" smtClean="0"/>
-              <a:t>Quartz Scheduler </a:t>
-            </a:r>
-            <a:r>
-              <a:rPr lang="en-US" dirty="0" smtClean="0"/>
-              <a:t>Deployment</a:t>
+              <a:t>Quartz Scheduler Deployment</a:t>
             </a:r>
             <a:endParaRPr lang="en-US" dirty="0"/>
           </a:p>
@@ -5435,20 +5597,30 @@
               <a:rPr lang="en-US" dirty="0" smtClean="0"/>
               <a:t>Standalone single JVM/Quartz scheduler</a:t>
             </a:r>
+          </a:p>
+          <a:p>
+            <a:r>
+              <a:rPr lang="en-US" dirty="0" smtClean="0"/>
+              <a:t>Server/Client based via RMI registry</a:t>
+            </a:r>
+          </a:p>
+          <a:p>
+            <a:r>
+              <a:rPr lang="en-US" dirty="0" smtClean="0"/>
+              <a:t>Web Container single JVM/Quartz </a:t>
+            </a:r>
+            <a:r>
+              <a:rPr lang="en-US" dirty="0" smtClean="0"/>
+              <a:t>scheduler</a:t>
+            </a:r>
+          </a:p>
+          <a:p>
+            <a:pPr lvl="1"/>
+            <a:r>
+              <a:rPr lang="en-US" dirty="0" smtClean="0"/>
+              <a:t>Allow http client to interact with scheduler!</a:t>
+            </a:r>
             <a:endParaRPr lang="en-US" dirty="0" smtClean="0"/>
-          </a:p>
-          <a:p>
-            <a:r>
-              <a:rPr lang="en-US" dirty="0" smtClean="0"/>
-              <a:t>Server/Client based via RMI registry</a:t>
-            </a:r>
-            <a:endParaRPr lang="en-US" dirty="0" smtClean="0"/>
-          </a:p>
-          <a:p>
-            <a:r>
-              <a:rPr lang="en-US" dirty="0" smtClean="0"/>
-              <a:t>Web Container single JVM/Quartz scheduler</a:t>
-            </a:r>
           </a:p>
           <a:p>
             <a:r>
@@ -5531,11 +5703,7 @@
           <a:p>
             <a:r>
               <a:rPr lang="en-US" dirty="0" smtClean="0"/>
-              <a:t>Scheduler Tips </a:t>
-            </a:r>
-            <a:r>
-              <a:rPr lang="en-US" dirty="0" smtClean="0"/>
-              <a:t>#1</a:t>
+              <a:t>Scheduler Tips #1</a:t>
             </a:r>
             <a:endParaRPr lang="en-US" dirty="0"/>
           </a:p>
@@ -5558,36 +5726,37 @@
           </a:bodyPr>
           <a:lstStyle/>
           <a:p>
-            <a:r>
-              <a:rPr lang="en-US" dirty="0" smtClean="0"/>
-              <a:t>Quartz </a:t>
-            </a:r>
+            <a:pPr algn="ctr">
+              <a:buNone/>
+            </a:pPr>
             <a:r>
               <a:rPr lang="en-US" dirty="0" err="1" smtClean="0"/>
-              <a:t>Cron</a:t>
-            </a:r>
-            <a:r>
-              <a:rPr lang="en-US" dirty="0" smtClean="0"/>
-              <a:t> Expression has 6 fields (down to seconds) + 1 optional year field</a:t>
-            </a:r>
-            <a:r>
-              <a:rPr lang="en-US" dirty="0" smtClean="0"/>
-              <a:t>.</a:t>
-            </a:r>
-            <a:endParaRPr lang="en-US" dirty="0" smtClean="0"/>
-          </a:p>
-          <a:p>
-            <a:r>
-              <a:rPr lang="en-US" dirty="0" smtClean="0"/>
-              <a:t>Typical Unix/Linux </a:t>
-            </a:r>
+              <a:t>SimpleTrigger’s</a:t>
+            </a:r>
+            <a:r>
+              <a:rPr lang="en-US" dirty="0" smtClean="0"/>
+              <a:t> </a:t>
+            </a:r>
+          </a:p>
+          <a:p>
+            <a:pPr algn="ctr">
+              <a:buNone/>
+            </a:pPr>
             <a:r>
               <a:rPr lang="en-US" dirty="0" err="1" smtClean="0"/>
-              <a:t>Cron</a:t>
-            </a:r>
-            <a:r>
-              <a:rPr lang="en-US" dirty="0" smtClean="0"/>
-              <a:t> expression has only 5 fields (down to mins only!)</a:t>
+              <a:t>repeatCount</a:t>
+            </a:r>
+            <a:r>
+              <a:rPr lang="en-US" dirty="0" smtClean="0"/>
+              <a:t> = Total </a:t>
+            </a:r>
+            <a:r>
+              <a:rPr lang="en-US" dirty="0" smtClean="0"/>
+              <a:t>Run </a:t>
+            </a:r>
+            <a:r>
+              <a:rPr lang="en-US" dirty="0" smtClean="0"/>
+              <a:t>Count + 1</a:t>
             </a:r>
             <a:endParaRPr lang="en-US" dirty="0"/>
           </a:p>

</xml_diff>

<commit_message>
updated jug presentation files.
</commit_message>
<xml_diff>
--- a/jug-quartz/JUG-QuartzScheduler.pptx
+++ b/jug-quartz/JUG-QuartzScheduler.pptx
@@ -5,23 +5,24 @@
     <p:sldMasterId id="2147483648" r:id="rId1"/>
   </p:sldMasterIdLst>
   <p:notesMasterIdLst>
-    <p:notesMasterId r:id="rId16"/>
+    <p:notesMasterId r:id="rId17"/>
   </p:notesMasterIdLst>
   <p:sldIdLst>
     <p:sldId id="256" r:id="rId2"/>
     <p:sldId id="282" r:id="rId3"/>
     <p:sldId id="290" r:id="rId4"/>
-    <p:sldId id="292" r:id="rId5"/>
-    <p:sldId id="291" r:id="rId6"/>
+    <p:sldId id="291" r:id="rId5"/>
+    <p:sldId id="299" r:id="rId6"/>
     <p:sldId id="293" r:id="rId7"/>
-    <p:sldId id="294" r:id="rId8"/>
-    <p:sldId id="295" r:id="rId9"/>
-    <p:sldId id="298" r:id="rId10"/>
-    <p:sldId id="289" r:id="rId11"/>
-    <p:sldId id="274" r:id="rId12"/>
-    <p:sldId id="296" r:id="rId13"/>
-    <p:sldId id="297" r:id="rId14"/>
-    <p:sldId id="263" r:id="rId15"/>
+    <p:sldId id="292" r:id="rId8"/>
+    <p:sldId id="294" r:id="rId9"/>
+    <p:sldId id="295" r:id="rId10"/>
+    <p:sldId id="298" r:id="rId11"/>
+    <p:sldId id="289" r:id="rId12"/>
+    <p:sldId id="274" r:id="rId13"/>
+    <p:sldId id="296" r:id="rId14"/>
+    <p:sldId id="297" r:id="rId15"/>
+    <p:sldId id="263" r:id="rId16"/>
   </p:sldIdLst>
   <p:sldSz cx="9144000" cy="6858000" type="screen4x3"/>
   <p:notesSz cx="6858000" cy="9144000"/>
@@ -206,7 +207,7 @@
             <a:fld id="{8AB11769-0C79-44AF-972A-3F5B927E1D64}" type="datetimeFigureOut">
               <a:rPr lang="en-US" smtClean="0"/>
               <a:pPr/>
-              <a:t>04/28/2011</a:t>
+              <a:t>05/24/2011</a:t>
             </a:fld>
             <a:endParaRPr lang="en-US"/>
           </a:p>
@@ -654,7 +655,7 @@
             <a:fld id="{3796407A-8687-4B8F-91F1-3AC1438651FB}" type="datetime1">
               <a:rPr lang="en-US" smtClean="0"/>
               <a:pPr/>
-              <a:t>04/28/2011</a:t>
+              <a:t>05/24/2011</a:t>
             </a:fld>
             <a:endParaRPr lang="en-US"/>
           </a:p>
@@ -821,7 +822,7 @@
             <a:fld id="{E5D373EA-8CA6-4B9B-9005-D717EF56EED0}" type="datetime1">
               <a:rPr lang="en-US" smtClean="0"/>
               <a:pPr/>
-              <a:t>04/28/2011</a:t>
+              <a:t>05/24/2011</a:t>
             </a:fld>
             <a:endParaRPr lang="en-US"/>
           </a:p>
@@ -998,7 +999,7 @@
             <a:fld id="{CF93068E-8064-4FF6-84D5-DB3803DB548E}" type="datetime1">
               <a:rPr lang="en-US" smtClean="0"/>
               <a:pPr/>
-              <a:t>04/28/2011</a:t>
+              <a:t>05/24/2011</a:t>
             </a:fld>
             <a:endParaRPr lang="en-US"/>
           </a:p>
@@ -1165,7 +1166,7 @@
             <a:fld id="{04D0F31D-9398-49EF-B43D-5AB5D9EC9D79}" type="datetime1">
               <a:rPr lang="en-US" smtClean="0"/>
               <a:pPr/>
-              <a:t>04/28/2011</a:t>
+              <a:t>05/24/2011</a:t>
             </a:fld>
             <a:endParaRPr lang="en-US"/>
           </a:p>
@@ -1408,7 +1409,7 @@
             <a:fld id="{2541B562-DB49-478B-9024-3A2F560D2B45}" type="datetime1">
               <a:rPr lang="en-US" smtClean="0"/>
               <a:pPr/>
-              <a:t>04/28/2011</a:t>
+              <a:t>05/24/2011</a:t>
             </a:fld>
             <a:endParaRPr lang="en-US"/>
           </a:p>
@@ -1693,7 +1694,7 @@
             <a:fld id="{C19490BC-31BD-41A3-A766-9A4E2E48CCA6}" type="datetime1">
               <a:rPr lang="en-US" smtClean="0"/>
               <a:pPr/>
-              <a:t>04/28/2011</a:t>
+              <a:t>05/24/2011</a:t>
             </a:fld>
             <a:endParaRPr lang="en-US"/>
           </a:p>
@@ -2112,7 +2113,7 @@
             <a:fld id="{A405D5C5-86E5-45B4-B053-E8D2C54A68DB}" type="datetime1">
               <a:rPr lang="en-US" smtClean="0"/>
               <a:pPr/>
-              <a:t>04/28/2011</a:t>
+              <a:t>05/24/2011</a:t>
             </a:fld>
             <a:endParaRPr lang="en-US"/>
           </a:p>
@@ -2227,7 +2228,7 @@
             <a:fld id="{C07B2446-96F0-44EF-846E-EFDA9C18662A}" type="datetime1">
               <a:rPr lang="en-US" smtClean="0"/>
               <a:pPr/>
-              <a:t>04/28/2011</a:t>
+              <a:t>05/24/2011</a:t>
             </a:fld>
             <a:endParaRPr lang="en-US"/>
           </a:p>
@@ -2319,7 +2320,7 @@
             <a:fld id="{109D3FB2-2BEE-4EB1-A67F-5819A21CEA98}" type="datetime1">
               <a:rPr lang="en-US" smtClean="0"/>
               <a:pPr/>
-              <a:t>04/28/2011</a:t>
+              <a:t>05/24/2011</a:t>
             </a:fld>
             <a:endParaRPr lang="en-US"/>
           </a:p>
@@ -2593,7 +2594,7 @@
             <a:fld id="{4742629B-6F0B-4137-9387-BA5E63C3590B}" type="datetime1">
               <a:rPr lang="en-US" smtClean="0"/>
               <a:pPr/>
-              <a:t>04/28/2011</a:t>
+              <a:t>05/24/2011</a:t>
             </a:fld>
             <a:endParaRPr lang="en-US"/>
           </a:p>
@@ -2843,7 +2844,7 @@
             <a:fld id="{4630A119-7BA1-4517-80A6-CAB5B4E035B4}" type="datetime1">
               <a:rPr lang="en-US" smtClean="0"/>
               <a:pPr/>
-              <a:t>04/28/2011</a:t>
+              <a:t>05/24/2011</a:t>
             </a:fld>
             <a:endParaRPr lang="en-US"/>
           </a:p>
@@ -3053,7 +3054,7 @@
             <a:fld id="{F554EC9A-6C8D-49D6-A5DB-D993F2740181}" type="datetime1">
               <a:rPr lang="en-US" smtClean="0"/>
               <a:pPr/>
-              <a:t>04/28/2011</a:t>
+              <a:t>05/24/2011</a:t>
             </a:fld>
             <a:endParaRPr lang="en-US"/>
           </a:p>
@@ -3576,11 +3577,7 @@
           <a:p>
             <a:r>
               <a:rPr lang="en-US" dirty="0" smtClean="0"/>
-              <a:t>Scheduler Tips </a:t>
-            </a:r>
-            <a:r>
-              <a:rPr lang="en-US" dirty="0" smtClean="0"/>
-              <a:t>#2</a:t>
+              <a:t>Scheduler Tips #1</a:t>
             </a:r>
             <a:endParaRPr lang="en-US" dirty="0"/>
           </a:p>
@@ -3603,33 +3600,63 @@
           </a:bodyPr>
           <a:lstStyle/>
           <a:p>
-            <a:r>
-              <a:rPr lang="en-US" dirty="0" smtClean="0"/>
-              <a:t>Quartz </a:t>
-            </a:r>
+            <a:pPr algn="ctr">
+              <a:buNone/>
+            </a:pPr>
             <a:r>
               <a:rPr lang="en-US" dirty="0" err="1" smtClean="0"/>
-              <a:t>Cron</a:t>
-            </a:r>
-            <a:r>
-              <a:rPr lang="en-US" dirty="0" smtClean="0"/>
-              <a:t> Expression has 6 fields (down to seconds) + 1 optional year field.</a:t>
-            </a:r>
-          </a:p>
-          <a:p>
-            <a:r>
-              <a:rPr lang="en-US" dirty="0" smtClean="0"/>
-              <a:t>Typical Unix/Linux </a:t>
+              <a:t>SimpleTrigger</a:t>
+            </a:r>
+            <a:r>
+              <a:rPr lang="en-US" dirty="0" smtClean="0"/>
+              <a:t> </a:t>
+            </a:r>
+          </a:p>
+          <a:p>
+            <a:pPr>
+              <a:buFontTx/>
+              <a:buChar char="-"/>
+            </a:pPr>
+            <a:r>
+              <a:rPr lang="en-US" dirty="0" smtClean="0"/>
+              <a:t>Total Run Count  = </a:t>
             </a:r>
             <a:r>
               <a:rPr lang="en-US" dirty="0" err="1" smtClean="0"/>
-              <a:t>Cron</a:t>
-            </a:r>
-            <a:r>
-              <a:rPr lang="en-US" dirty="0" smtClean="0"/>
-              <a:t> expression has only 5 fields (down to mins only!)</a:t>
-            </a:r>
-            <a:endParaRPr lang="en-US" dirty="0"/>
+              <a:t>RepeatCount</a:t>
+            </a:r>
+            <a:r>
+              <a:rPr lang="en-US" dirty="0" smtClean="0"/>
+              <a:t> - 1</a:t>
+            </a:r>
+          </a:p>
+          <a:p>
+            <a:pPr>
+              <a:buFontTx/>
+              <a:buChar char="-"/>
+            </a:pPr>
+            <a:r>
+              <a:rPr lang="en-US" dirty="0" smtClean="0"/>
+              <a:t>You able to specify an end date regardless of </a:t>
+            </a:r>
+            <a:r>
+              <a:rPr lang="en-US" dirty="0" err="1" smtClean="0"/>
+              <a:t>repeatCount</a:t>
+            </a:r>
+            <a:r>
+              <a:rPr lang="en-US" dirty="0" smtClean="0"/>
+              <a:t>.</a:t>
+            </a:r>
+          </a:p>
+          <a:p>
+            <a:pPr>
+              <a:buFontTx/>
+              <a:buChar char="-"/>
+            </a:pPr>
+            <a:r>
+              <a:rPr lang="en-US" dirty="0" smtClean="0"/>
+              <a:t>Trigger is NOT sensitive to Daylight Saving Time (DST).</a:t>
+            </a:r>
           </a:p>
         </p:txBody>
       </p:sp>
@@ -3706,11 +3733,7 @@
           <a:p>
             <a:r>
               <a:rPr lang="en-US" dirty="0" smtClean="0"/>
-              <a:t>Scheduler Tips </a:t>
-            </a:r>
-            <a:r>
-              <a:rPr lang="en-US" dirty="0" smtClean="0"/>
-              <a:t>#3</a:t>
+              <a:t>Scheduler Tips #2</a:t>
             </a:r>
             <a:endParaRPr lang="en-US" dirty="0"/>
           </a:p>
@@ -3733,110 +3756,61 @@
           </a:bodyPr>
           <a:lstStyle/>
           <a:p>
-            <a:pPr lvl="1" algn="ctr">
+            <a:pPr algn="ctr">
               <a:buNone/>
             </a:pPr>
             <a:r>
-              <a:rPr lang="en-US" dirty="0" smtClean="0"/>
-              <a:t>Tired of </a:t>
-            </a:r>
-            <a:r>
-              <a:rPr lang="en-US" dirty="0" err="1" smtClean="0">
-                <a:solidFill>
-                  <a:srgbClr val="FF0000"/>
-                </a:solidFill>
-              </a:rPr>
-              <a:t>java.util.Calendar</a:t>
-            </a:r>
-            <a:r>
-              <a:rPr lang="en-US" dirty="0" smtClean="0">
-                <a:solidFill>
-                  <a:srgbClr val="FF0000"/>
-                </a:solidFill>
-              </a:rPr>
-              <a:t> </a:t>
-            </a:r>
-            <a:r>
-              <a:rPr lang="en-US" dirty="0" smtClean="0"/>
-              <a:t>&amp; </a:t>
-            </a:r>
-            <a:r>
-              <a:rPr lang="en-US" dirty="0" err="1" smtClean="0">
-                <a:solidFill>
-                  <a:srgbClr val="FF0000"/>
-                </a:solidFill>
-              </a:rPr>
-              <a:t>java.util.Date</a:t>
-            </a:r>
-            <a:r>
-              <a:rPr lang="en-US" dirty="0" smtClean="0">
-                <a:solidFill>
-                  <a:srgbClr val="FF0000"/>
-                </a:solidFill>
-              </a:rPr>
-              <a:t>?</a:t>
-            </a:r>
-          </a:p>
-          <a:p>
-            <a:pPr lvl="1" algn="ctr">
-              <a:buNone/>
-            </a:pPr>
+              <a:rPr lang="en-US" dirty="0" err="1" smtClean="0"/>
+              <a:t>CronTrigger</a:t>
+            </a:r>
             <a:endParaRPr lang="en-US" dirty="0" smtClean="0"/>
           </a:p>
           <a:p>
-            <a:pPr lvl="1" algn="ctr">
-              <a:buNone/>
-            </a:pPr>
-            <a:r>
-              <a:rPr lang="en-US" dirty="0" smtClean="0"/>
-              <a:t>Use </a:t>
-            </a:r>
             <a:r>
               <a:rPr lang="en-US" dirty="0" err="1" smtClean="0"/>
-              <a:t>org.quartz.</a:t>
-            </a:r>
-            <a:r>
-              <a:rPr lang="en-US" dirty="0" err="1" smtClean="0">
-                <a:solidFill>
-                  <a:srgbClr val="00B050"/>
-                </a:solidFill>
-              </a:rPr>
-              <a:t>TriggerUtils</a:t>
-            </a:r>
-            <a:r>
-              <a:rPr lang="en-US" dirty="0" smtClean="0"/>
-              <a:t> or</a:t>
-            </a:r>
-          </a:p>
-          <a:p>
-            <a:pPr lvl="1" algn="ctr">
-              <a:buNone/>
-            </a:pPr>
-            <a:r>
-              <a:rPr lang="en-US" dirty="0" smtClean="0"/>
-              <a:t>Apache commons-</a:t>
+              <a:t>Cron</a:t>
+            </a:r>
+            <a:r>
+              <a:rPr lang="en-US" dirty="0" smtClean="0"/>
+              <a:t> Expression has 6 + 1 optional fields.</a:t>
+            </a:r>
+          </a:p>
+          <a:p>
+            <a:r>
+              <a:rPr lang="en-US" dirty="0" smtClean="0"/>
+              <a:t>Finest field unit is in second. </a:t>
+            </a:r>
+          </a:p>
+          <a:p>
+            <a:r>
+              <a:rPr lang="en-US" dirty="0" smtClean="0"/>
+              <a:t>Trigger is </a:t>
             </a:r>
             <a:r>
               <a:rPr lang="en-US" dirty="0" err="1" smtClean="0"/>
-              <a:t>langs</a:t>
-            </a:r>
-            <a:r>
-              <a:rPr lang="en-US" dirty="0" smtClean="0"/>
-              <a:t> </a:t>
-            </a:r>
-            <a:r>
-              <a:rPr lang="en-US" dirty="0" err="1" smtClean="0">
-                <a:solidFill>
-                  <a:srgbClr val="00B050"/>
-                </a:solidFill>
-              </a:rPr>
-              <a:t>DateUtils</a:t>
-            </a:r>
-            <a:endParaRPr lang="en-US" dirty="0" smtClean="0">
-              <a:solidFill>
-                <a:srgbClr val="FF0000"/>
-              </a:solidFill>
-            </a:endParaRPr>
+              <a:t>senstive</a:t>
+            </a:r>
+            <a:r>
+              <a:rPr lang="en-US" dirty="0" smtClean="0"/>
+              <a:t> to DST.</a:t>
+            </a:r>
+          </a:p>
+          <a:p>
+            <a:r>
+              <a:rPr lang="en-US" dirty="0" smtClean="0"/>
+              <a:t>Day-Of-Week starts with </a:t>
+            </a:r>
+            <a:r>
+              <a:rPr lang="en-US" dirty="0" smtClean="0"/>
+              <a:t>1=SUN</a:t>
+            </a:r>
+          </a:p>
+          <a:p>
+            <a:r>
+              <a:rPr lang="en-US" dirty="0" smtClean="0"/>
+              <a:t>You are allow only one Nth day-of-week (‘#’).</a:t>
+            </a:r>
+            <a:endParaRPr lang="en-US" dirty="0" smtClean="0"/>
           </a:p>
         </p:txBody>
       </p:sp>
@@ -3913,11 +3887,7 @@
           <a:p>
             <a:r>
               <a:rPr lang="en-US" dirty="0" smtClean="0"/>
-              <a:t>Scheduler Tips </a:t>
-            </a:r>
-            <a:r>
-              <a:rPr lang="en-US" dirty="0" smtClean="0"/>
-              <a:t>#4</a:t>
+              <a:t>Scheduler Tips #3</a:t>
             </a:r>
             <a:endParaRPr lang="en-US" dirty="0"/>
           </a:p>
@@ -3935,53 +3905,115 @@
         </p:nvSpPr>
         <p:spPr/>
         <p:txBody>
-          <a:bodyPr anchor="t">
+          <a:bodyPr anchor="ctr">
             <a:normAutofit/>
           </a:bodyPr>
           <a:lstStyle/>
           <a:p>
-            <a:pPr lvl="1">
+            <a:pPr lvl="1" algn="ctr">
               <a:buNone/>
             </a:pPr>
             <a:r>
               <a:rPr lang="en-US" dirty="0" smtClean="0"/>
-              <a:t>Spring Quartz Scheduler</a:t>
-            </a:r>
-          </a:p>
-          <a:p>
-            <a:pPr lvl="1"/>
-            <a:r>
-              <a:rPr lang="en-US" dirty="0" smtClean="0"/>
-              <a:t>You can’t disable auto shutdown!</a:t>
+              <a:t>Tired of </a:t>
+            </a:r>
+            <a:r>
+              <a:rPr lang="en-US" dirty="0" err="1" smtClean="0">
+                <a:solidFill>
+                  <a:srgbClr val="FF0000"/>
+                </a:solidFill>
+              </a:rPr>
+              <a:t>java.util.Calendar</a:t>
+            </a:r>
+            <a:r>
+              <a:rPr lang="en-US" dirty="0" smtClean="0">
+                <a:solidFill>
+                  <a:srgbClr val="FF0000"/>
+                </a:solidFill>
+              </a:rPr>
+              <a:t> </a:t>
+            </a:r>
+            <a:r>
+              <a:rPr lang="en-US" dirty="0" smtClean="0"/>
+              <a:t>&amp; </a:t>
+            </a:r>
+            <a:r>
+              <a:rPr lang="en-US" dirty="0" err="1" smtClean="0">
+                <a:solidFill>
+                  <a:srgbClr val="FF0000"/>
+                </a:solidFill>
+              </a:rPr>
+              <a:t>java.util.Date</a:t>
+            </a:r>
+            <a:r>
+              <a:rPr lang="en-US" dirty="0" smtClean="0">
+                <a:solidFill>
+                  <a:srgbClr val="FF0000"/>
+                </a:solidFill>
+              </a:rPr>
+              <a:t>?</a:t>
+            </a:r>
+          </a:p>
+          <a:p>
+            <a:pPr lvl="1" algn="ctr">
+              <a:buNone/>
+            </a:pPr>
+            <a:endParaRPr lang="en-US" dirty="0" smtClean="0"/>
+          </a:p>
+          <a:p>
+            <a:pPr lvl="1" algn="ctr">
+              <a:buNone/>
+            </a:pPr>
+            <a:r>
+              <a:rPr lang="en-US" dirty="0" smtClean="0"/>
+              <a:t>Use </a:t>
+            </a:r>
+            <a:r>
+              <a:rPr lang="en-US" dirty="0" err="1" smtClean="0"/>
+              <a:t>org.quartz.</a:t>
+            </a:r>
+            <a:r>
+              <a:rPr lang="en-US" dirty="0" err="1" smtClean="0">
+                <a:solidFill>
+                  <a:srgbClr val="00B050"/>
+                </a:solidFill>
+              </a:rPr>
+              <a:t>TriggerUtils</a:t>
+            </a:r>
+            <a:r>
+              <a:rPr lang="en-US" dirty="0" smtClean="0"/>
+              <a:t> or</a:t>
+            </a:r>
+          </a:p>
+          <a:p>
+            <a:pPr lvl="1" algn="ctr">
+              <a:buNone/>
+            </a:pPr>
+            <a:r>
+              <a:rPr lang="en-US" dirty="0" smtClean="0"/>
+              <a:t>Apache commons-</a:t>
+            </a:r>
+            <a:r>
+              <a:rPr lang="en-US" dirty="0" err="1" smtClean="0"/>
+              <a:t>langs</a:t>
+            </a:r>
+            <a:r>
+              <a:rPr lang="en-US" dirty="0" smtClean="0"/>
+              <a:t> </a:t>
+            </a:r>
+            <a:r>
+              <a:rPr lang="en-US" dirty="0" err="1" smtClean="0">
+                <a:solidFill>
+                  <a:srgbClr val="00B050"/>
+                </a:solidFill>
+              </a:rPr>
+              <a:t>DateUtils</a:t>
             </a:r>
             <a:endParaRPr lang="en-US" dirty="0" smtClean="0">
               <a:solidFill>
                 <a:srgbClr val="FF0000"/>
               </a:solidFill>
             </a:endParaRPr>
-          </a:p>
-          <a:p>
-            <a:pPr lvl="1"/>
-            <a:r>
-              <a:rPr lang="en-US" dirty="0" smtClean="0"/>
-              <a:t>Usage of </a:t>
-            </a:r>
-            <a:r>
-              <a:rPr lang="en-US" dirty="0" err="1" smtClean="0"/>
-              <a:t>dataSource</a:t>
-            </a:r>
-            <a:r>
-              <a:rPr lang="en-US" dirty="0" smtClean="0"/>
-              <a:t> force to use </a:t>
-            </a:r>
-            <a:r>
-              <a:rPr lang="en-US" dirty="0" err="1" smtClean="0"/>
-              <a:t>DBTable</a:t>
-            </a:r>
-            <a:r>
-              <a:rPr lang="en-US" dirty="0" smtClean="0"/>
-              <a:t> locks.</a:t>
-            </a:r>
           </a:p>
         </p:txBody>
       </p:sp>
@@ -4058,15 +4090,7 @@
           <a:p>
             <a:r>
               <a:rPr lang="en-US" dirty="0" smtClean="0"/>
-              <a:t>Scheduler Tips </a:t>
-            </a:r>
-            <a:r>
-              <a:rPr lang="en-US" dirty="0" smtClean="0"/>
-              <a:t>#</a:t>
-            </a:r>
-            <a:r>
-              <a:rPr lang="en-US" dirty="0" smtClean="0"/>
-              <a:t>5</a:t>
+              <a:t>Scheduler Tips #4</a:t>
             </a:r>
             <a:endParaRPr lang="en-US" dirty="0"/>
           </a:p>
@@ -4084,27 +4108,73 @@
         </p:nvSpPr>
         <p:spPr/>
         <p:txBody>
-          <a:bodyPr anchor="ctr">
+          <a:bodyPr anchor="t">
             <a:normAutofit/>
           </a:bodyPr>
           <a:lstStyle/>
           <a:p>
-            <a:pPr lvl="1" algn="ctr">
+            <a:pPr lvl="1">
               <a:buNone/>
             </a:pPr>
             <a:r>
               <a:rPr lang="en-US" dirty="0" smtClean="0"/>
-              <a:t>When using RMI server mode, there is a bug that can crash your scheduler:</a:t>
-            </a:r>
-          </a:p>
-          <a:p>
-            <a:pPr lvl="1" algn="ctr">
-              <a:buNone/>
-            </a:pPr>
-            <a:r>
-              <a:rPr lang="en-US" dirty="0" smtClean="0"/>
-              <a:t>http://jira.terracotta.org/jira/browse/QTZ-135</a:t>
-            </a:r>
+              <a:t>Spring Quartz Scheduler</a:t>
+            </a:r>
+          </a:p>
+          <a:p>
+            <a:pPr lvl="1"/>
+            <a:r>
+              <a:rPr lang="en-US" dirty="0" smtClean="0"/>
+              <a:t>You can’t disable auto shutdown!</a:t>
+            </a:r>
+            <a:endParaRPr lang="en-US" dirty="0" smtClean="0">
+              <a:solidFill>
+                <a:srgbClr val="FF0000"/>
+              </a:solidFill>
+            </a:endParaRPr>
+          </a:p>
+          <a:p>
+            <a:pPr lvl="1"/>
+            <a:r>
+              <a:rPr lang="en-US" dirty="0" smtClean="0"/>
+              <a:t>The </a:t>
+            </a:r>
+            <a:r>
+              <a:rPr lang="en-US" dirty="0" err="1" smtClean="0"/>
+              <a:t>dataSource</a:t>
+            </a:r>
+            <a:r>
+              <a:rPr lang="en-US" dirty="0" smtClean="0"/>
+              <a:t> can</a:t>
+            </a:r>
+            <a:r>
+              <a:rPr lang="en-US" dirty="0" smtClean="0"/>
+              <a:t> partake </a:t>
+            </a:r>
+            <a:r>
+              <a:rPr lang="en-US" dirty="0" smtClean="0"/>
+              <a:t>Spring </a:t>
+            </a:r>
+            <a:r>
+              <a:rPr lang="en-US" dirty="0" err="1" smtClean="0"/>
+              <a:t>Tx</a:t>
+            </a:r>
+            <a:r>
+              <a:rPr lang="en-US" dirty="0" smtClean="0"/>
+              <a:t> Manager Abstraction.</a:t>
+            </a:r>
+          </a:p>
+          <a:p>
+            <a:pPr lvl="1"/>
+            <a:r>
+              <a:rPr lang="en-US" dirty="0" smtClean="0"/>
+              <a:t>Job may have access to Spring App Context through the Scheduler’s Context </a:t>
+            </a:r>
+            <a:r>
+              <a:rPr lang="en-US" smtClean="0"/>
+              <a:t>space.</a:t>
+            </a:r>
+            <a:endParaRPr lang="en-US" dirty="0" smtClean="0"/>
           </a:p>
         </p:txBody>
       </p:sp>
@@ -4166,22 +4236,22 @@
       </p:grpSpPr>
       <p:sp>
         <p:nvSpPr>
-          <p:cNvPr id="4" name="Title 3"/>
-          <p:cNvSpPr>
-            <a:spLocks noGrp="1"/>
-          </p:cNvSpPr>
-          <p:nvPr>
-            <p:ph type="ctrTitle"/>
-          </p:nvPr>
-        </p:nvSpPr>
-        <p:spPr/>
-        <p:txBody>
-          <a:bodyPr/>
-          <a:lstStyle/>
-          <a:p>
-            <a:r>
-              <a:rPr lang="en-US" dirty="0" smtClean="0"/>
-              <a:t>Questions?</a:t>
+          <p:cNvPr id="2" name="Title 1"/>
+          <p:cNvSpPr>
+            <a:spLocks noGrp="1"/>
+          </p:cNvSpPr>
+          <p:nvPr>
+            <p:ph type="title"/>
+          </p:nvPr>
+        </p:nvSpPr>
+        <p:spPr/>
+        <p:txBody>
+          <a:bodyPr/>
+          <a:lstStyle/>
+          <a:p>
+            <a:r>
+              <a:rPr lang="en-US" dirty="0" smtClean="0"/>
+              <a:t>Scheduler Tips #5</a:t>
             </a:r>
             <a:endParaRPr lang="en-US" dirty="0"/>
           </a:p>
@@ -4189,7 +4259,43 @@
       </p:sp>
       <p:sp>
         <p:nvSpPr>
-          <p:cNvPr id="3" name="Slide Number Placeholder 2"/>
+          <p:cNvPr id="3" name="Content Placeholder 2"/>
+          <p:cNvSpPr>
+            <a:spLocks noGrp="1"/>
+          </p:cNvSpPr>
+          <p:nvPr>
+            <p:ph idx="1"/>
+          </p:nvPr>
+        </p:nvSpPr>
+        <p:spPr/>
+        <p:txBody>
+          <a:bodyPr anchor="ctr">
+            <a:normAutofit/>
+          </a:bodyPr>
+          <a:lstStyle/>
+          <a:p>
+            <a:pPr lvl="1" algn="ctr">
+              <a:buNone/>
+            </a:pPr>
+            <a:r>
+              <a:rPr lang="en-US" dirty="0" smtClean="0"/>
+              <a:t>When using RMI server mode, there is a bug that can crash your scheduler:</a:t>
+            </a:r>
+          </a:p>
+          <a:p>
+            <a:pPr lvl="1" algn="ctr">
+              <a:buNone/>
+            </a:pPr>
+            <a:r>
+              <a:rPr lang="en-US" dirty="0" smtClean="0"/>
+              <a:t>http://jira.terracotta.org/jira/browse/QTZ-135</a:t>
+            </a:r>
+          </a:p>
+        </p:txBody>
+      </p:sp>
+      <p:sp>
+        <p:nvSpPr>
+          <p:cNvPr id="4" name="Slide Number Placeholder 3"/>
           <p:cNvSpPr>
             <a:spLocks noGrp="1"/>
           </p:cNvSpPr>
@@ -4206,6 +4312,85 @@
               <a:rPr lang="en-US" smtClean="0"/>
               <a:pPr/>
               <a:t>14</a:t>
+            </a:fld>
+            <a:endParaRPr lang="en-US"/>
+          </a:p>
+        </p:txBody>
+      </p:sp>
+    </p:spTree>
+  </p:cSld>
+  <p:clrMapOvr>
+    <a:masterClrMapping/>
+  </p:clrMapOvr>
+  <p:timing>
+    <p:tnLst>
+      <p:par>
+        <p:cTn id="1" dur="indefinite" restart="never" nodeType="tmRoot"/>
+      </p:par>
+    </p:tnLst>
+  </p:timing>
+</p:sld>
+</file>
+
+<file path=ppt/slides/slide15.xml><?xml version="1.0" encoding="utf-8"?>
+<p:sld xmlns:a="http://schemas.openxmlformats.org/drawingml/2006/main" xmlns:r="http://schemas.openxmlformats.org/officeDocument/2006/relationships" xmlns:p="http://schemas.openxmlformats.org/presentationml/2006/main">
+  <p:cSld>
+    <p:spTree>
+      <p:nvGrpSpPr>
+        <p:cNvPr id="1" name=""/>
+        <p:cNvGrpSpPr/>
+        <p:nvPr/>
+      </p:nvGrpSpPr>
+      <p:grpSpPr>
+        <a:xfrm>
+          <a:off x="0" y="0"/>
+          <a:ext cx="0" cy="0"/>
+          <a:chOff x="0" y="0"/>
+          <a:chExt cx="0" cy="0"/>
+        </a:xfrm>
+      </p:grpSpPr>
+      <p:sp>
+        <p:nvSpPr>
+          <p:cNvPr id="4" name="Title 3"/>
+          <p:cNvSpPr>
+            <a:spLocks noGrp="1"/>
+          </p:cNvSpPr>
+          <p:nvPr>
+            <p:ph type="ctrTitle"/>
+          </p:nvPr>
+        </p:nvSpPr>
+        <p:spPr/>
+        <p:txBody>
+          <a:bodyPr/>
+          <a:lstStyle/>
+          <a:p>
+            <a:r>
+              <a:rPr lang="en-US" dirty="0" smtClean="0"/>
+              <a:t>Questions?</a:t>
+            </a:r>
+            <a:endParaRPr lang="en-US" dirty="0"/>
+          </a:p>
+        </p:txBody>
+      </p:sp>
+      <p:sp>
+        <p:nvSpPr>
+          <p:cNvPr id="3" name="Slide Number Placeholder 2"/>
+          <p:cNvSpPr>
+            <a:spLocks noGrp="1"/>
+          </p:cNvSpPr>
+          <p:nvPr>
+            <p:ph type="sldNum" sz="quarter" idx="12"/>
+          </p:nvPr>
+        </p:nvSpPr>
+        <p:spPr/>
+        <p:txBody>
+          <a:bodyPr/>
+          <a:lstStyle/>
+          <a:p>
+            <a:fld id="{D122669F-2901-44A4-93DF-17D7DEF702D7}" type="slidenum">
+              <a:rPr lang="en-US" smtClean="0"/>
+              <a:pPr/>
+              <a:t>15</a:t>
             </a:fld>
             <a:endParaRPr lang="en-US"/>
           </a:p>
@@ -4438,13 +4623,13 @@
           <a:p>
             <a:r>
               <a:rPr lang="en-US" dirty="0" smtClean="0"/>
-              <a:t>Rich and flexible API to the scheduler</a:t>
-            </a:r>
-          </a:p>
-          <a:p>
-            <a:r>
-              <a:rPr lang="en-US" dirty="0" smtClean="0"/>
-              <a:t>Data persistence</a:t>
+              <a:t>A rich API set to the scheduler</a:t>
+            </a:r>
+          </a:p>
+          <a:p>
+            <a:r>
+              <a:rPr lang="en-US" dirty="0" smtClean="0"/>
+              <a:t>Job data persistence</a:t>
             </a:r>
           </a:p>
           <a:p>
@@ -4452,13 +4637,6 @@
               <a:rPr lang="en-US" dirty="0" smtClean="0"/>
               <a:t>Job executions control</a:t>
             </a:r>
-          </a:p>
-          <a:p>
-            <a:r>
-              <a:rPr lang="en-US" dirty="0" smtClean="0"/>
-              <a:t>Schedulers clustering</a:t>
-            </a:r>
-            <a:endParaRPr lang="en-US" dirty="0"/>
           </a:p>
         </p:txBody>
       </p:sp>
@@ -4528,38 +4706,12 @@
             <p:ph type="title"/>
           </p:nvPr>
         </p:nvSpPr>
-        <p:spPr/>
-        <p:txBody>
-          <a:bodyPr/>
-          <a:lstStyle/>
-          <a:p>
-            <a:r>
-              <a:rPr lang="en-US" dirty="0" smtClean="0"/>
-              <a:t>Introduction: Quartz 2.0 </a:t>
-            </a:r>
-            <a:r>
-              <a:rPr lang="en-US" dirty="0" err="1" smtClean="0"/>
-              <a:t>vs</a:t>
-            </a:r>
-            <a:r>
-              <a:rPr lang="en-US" dirty="0" smtClean="0"/>
-              <a:t> 1.8</a:t>
-            </a:r>
-            <a:endParaRPr lang="en-US" dirty="0"/>
-          </a:p>
-        </p:txBody>
-      </p:sp>
-      <p:sp>
-        <p:nvSpPr>
-          <p:cNvPr id="3" name="Content Placeholder 2"/>
-          <p:cNvSpPr>
-            <a:spLocks noGrp="1"/>
-          </p:cNvSpPr>
-          <p:nvPr>
-            <p:ph idx="1"/>
-          </p:nvPr>
-        </p:nvSpPr>
-        <p:spPr/>
+        <p:spPr>
+          <a:xfrm>
+            <a:off x="457200" y="152400"/>
+            <a:ext cx="8229600" cy="1143000"/>
+          </a:xfrm>
+        </p:spPr>
         <p:txBody>
           <a:bodyPr>
             <a:normAutofit/>
@@ -4568,29 +4720,9 @@
           <a:p>
             <a:r>
               <a:rPr lang="en-US" dirty="0" smtClean="0"/>
-              <a:t>Released in March 2011</a:t>
-            </a:r>
-          </a:p>
-          <a:p>
-            <a:r>
-              <a:rPr lang="en-US" dirty="0" smtClean="0"/>
-              <a:t>New API</a:t>
-            </a:r>
-          </a:p>
-          <a:p>
-            <a:r>
-              <a:rPr lang="en-US" dirty="0" smtClean="0"/>
-              <a:t>Java DSL for creating jobs</a:t>
-            </a:r>
-          </a:p>
-          <a:p>
-            <a:r>
-              <a:rPr lang="en-US" dirty="0" smtClean="0"/>
-              <a:t>Database schema changes</a:t>
-            </a:r>
-          </a:p>
-          <a:p>
-            <a:endParaRPr lang="en-US" dirty="0" smtClean="0"/>
+              <a:t>Creating A Job Class</a:t>
+            </a:r>
+            <a:endParaRPr lang="en-US" sz="3600" i="1" dirty="0"/>
           </a:p>
         </p:txBody>
       </p:sp>
@@ -4620,32 +4752,551 @@
       </p:sp>
       <p:sp>
         <p:nvSpPr>
-          <p:cNvPr id="5" name="TextBox 4"/>
-          <p:cNvSpPr txBox="1"/>
+          <p:cNvPr id="5" name="Content Placeholder 2"/>
+          <p:cNvSpPr txBox="1">
+            <a:spLocks/>
+          </p:cNvSpPr>
           <p:nvPr/>
         </p:nvSpPr>
         <p:spPr>
           <a:xfrm>
-            <a:off x="838200" y="5334000"/>
-            <a:ext cx="8001000" cy="381000"/>
+            <a:off x="457200" y="1905000"/>
+            <a:ext cx="8229600" cy="4191000"/>
           </a:xfrm>
           <a:prstGeom prst="rect">
             <a:avLst/>
           </a:prstGeom>
-          <a:noFill/>
+          <a:ln>
+            <a:solidFill>
+              <a:schemeClr val="tx1"/>
+            </a:solidFill>
+          </a:ln>
         </p:spPr>
         <p:txBody>
-          <a:bodyPr wrap="square" rtlCol="0">
-            <a:spAutoFit/>
+          <a:bodyPr vert="horz" lIns="91440" tIns="45720" rIns="91440" bIns="45720" rtlCol="0">
+            <a:normAutofit/>
           </a:bodyPr>
           <a:lstStyle/>
           <a:p>
-            <a:pPr algn="ctr"/>
-            <a:r>
-              <a:rPr lang="en-US" dirty="0" smtClean="0"/>
-              <a:t>http://quartz-scheduler.org/docs/2.0/newInQuartz2.html</a:t>
-            </a:r>
-            <a:endParaRPr lang="en-US" dirty="0"/>
+            <a:pPr marL="342900" marR="0" lvl="0" indent="-342900" algn="l" defTabSz="914400" rtl="0" eaLnBrk="1" fontAlgn="auto" latinLnBrk="0" hangingPunct="1">
+              <a:lnSpc>
+                <a:spcPct val="100000"/>
+              </a:lnSpc>
+              <a:spcBef>
+                <a:spcPct val="20000"/>
+              </a:spcBef>
+              <a:spcAft>
+                <a:spcPts val="0"/>
+              </a:spcAft>
+              <a:buClrTx/>
+              <a:buSzTx/>
+              <a:buFont typeface="Arial" pitchFamily="34" charset="0"/>
+              <a:buNone/>
+              <a:tabLst/>
+              <a:defRPr/>
+            </a:pPr>
+            <a:endParaRPr kumimoji="0" lang="en-US" sz="1400" b="0" i="0" u="none" strike="noStrike" kern="1200" cap="none" spc="0" normalizeH="0" baseline="0" noProof="0" dirty="0" smtClean="0">
+              <a:ln>
+                <a:noFill/>
+              </a:ln>
+              <a:solidFill>
+                <a:schemeClr val="tx1"/>
+              </a:solidFill>
+              <a:effectLst/>
+              <a:uLnTx/>
+              <a:uFillTx/>
+              <a:latin typeface="Courier New" pitchFamily="49" charset="0"/>
+              <a:ea typeface="+mn-ea"/>
+              <a:cs typeface="Courier New" pitchFamily="49" charset="0"/>
+            </a:endParaRPr>
+          </a:p>
+          <a:p>
+            <a:pPr marL="342900" marR="0" lvl="0" indent="-342900" algn="l" defTabSz="914400" rtl="0" eaLnBrk="1" fontAlgn="auto" latinLnBrk="0" hangingPunct="1">
+              <a:lnSpc>
+                <a:spcPct val="100000"/>
+              </a:lnSpc>
+              <a:spcBef>
+                <a:spcPct val="20000"/>
+              </a:spcBef>
+              <a:spcAft>
+                <a:spcPts val="0"/>
+              </a:spcAft>
+              <a:buClrTx/>
+              <a:buSzTx/>
+              <a:buFont typeface="Arial" pitchFamily="34" charset="0"/>
+              <a:buNone/>
+              <a:tabLst/>
+              <a:defRPr/>
+            </a:pPr>
+            <a:endParaRPr lang="en-US" sz="1400" dirty="0" smtClean="0">
+              <a:latin typeface="Courier New" pitchFamily="49" charset="0"/>
+              <a:cs typeface="Courier New" pitchFamily="49" charset="0"/>
+            </a:endParaRPr>
+          </a:p>
+          <a:p>
+            <a:pPr marL="342900" marR="0" lvl="0" indent="-342900" algn="l" defTabSz="914400" rtl="0" eaLnBrk="1" fontAlgn="auto" latinLnBrk="0" hangingPunct="1">
+              <a:lnSpc>
+                <a:spcPct val="100000"/>
+              </a:lnSpc>
+              <a:spcBef>
+                <a:spcPct val="20000"/>
+              </a:spcBef>
+              <a:spcAft>
+                <a:spcPts val="0"/>
+              </a:spcAft>
+              <a:buClrTx/>
+              <a:buSzTx/>
+              <a:buFont typeface="Arial" pitchFamily="34" charset="0"/>
+              <a:buNone/>
+              <a:tabLst/>
+              <a:defRPr/>
+            </a:pPr>
+            <a:endParaRPr kumimoji="0" lang="en-US" sz="1400" b="0" i="0" u="none" strike="noStrike" kern="1200" cap="none" spc="0" normalizeH="0" baseline="0" noProof="0" dirty="0" smtClean="0">
+              <a:ln>
+                <a:noFill/>
+              </a:ln>
+              <a:solidFill>
+                <a:schemeClr val="tx1"/>
+              </a:solidFill>
+              <a:effectLst/>
+              <a:uLnTx/>
+              <a:uFillTx/>
+              <a:latin typeface="Courier New" pitchFamily="49" charset="0"/>
+              <a:ea typeface="+mn-ea"/>
+              <a:cs typeface="Courier New" pitchFamily="49" charset="0"/>
+            </a:endParaRPr>
+          </a:p>
+          <a:p>
+            <a:pPr marL="342900" marR="0" lvl="0" indent="-342900" algn="l" defTabSz="914400" rtl="0" eaLnBrk="1" fontAlgn="auto" latinLnBrk="0" hangingPunct="1">
+              <a:lnSpc>
+                <a:spcPct val="100000"/>
+              </a:lnSpc>
+              <a:spcBef>
+                <a:spcPct val="20000"/>
+              </a:spcBef>
+              <a:spcAft>
+                <a:spcPts val="0"/>
+              </a:spcAft>
+              <a:buClrTx/>
+              <a:buSzTx/>
+              <a:buFont typeface="Arial" pitchFamily="34" charset="0"/>
+              <a:buNone/>
+              <a:tabLst/>
+              <a:defRPr/>
+            </a:pPr>
+            <a:r>
+              <a:rPr kumimoji="0" lang="en-US" sz="1400" b="0" i="0" u="none" strike="noStrike" kern="1200" cap="none" spc="0" normalizeH="0" baseline="0" noProof="0" dirty="0" smtClean="0">
+                <a:ln>
+                  <a:noFill/>
+                </a:ln>
+                <a:solidFill>
+                  <a:schemeClr val="tx1"/>
+                </a:solidFill>
+                <a:effectLst/>
+                <a:uLnTx/>
+                <a:uFillTx/>
+                <a:latin typeface="Courier New" pitchFamily="49" charset="0"/>
+                <a:ea typeface="+mn-ea"/>
+                <a:cs typeface="Courier New" pitchFamily="49" charset="0"/>
+              </a:rPr>
+              <a:t>public class </a:t>
+            </a:r>
+            <a:r>
+              <a:rPr kumimoji="0" lang="en-US" sz="1400" b="0" i="0" u="none" strike="noStrike" kern="1200" cap="none" spc="0" normalizeH="0" baseline="0" noProof="0" dirty="0" err="1" smtClean="0">
+                <a:ln>
+                  <a:noFill/>
+                </a:ln>
+                <a:solidFill>
+                  <a:schemeClr val="tx1"/>
+                </a:solidFill>
+                <a:effectLst/>
+                <a:uLnTx/>
+                <a:uFillTx/>
+                <a:latin typeface="Courier New" pitchFamily="49" charset="0"/>
+                <a:ea typeface="+mn-ea"/>
+                <a:cs typeface="Courier New" pitchFamily="49" charset="0"/>
+              </a:rPr>
+              <a:t>SimpleJob</a:t>
+            </a:r>
+            <a:r>
+              <a:rPr kumimoji="0" lang="en-US" sz="1400" b="0" i="0" u="none" strike="noStrike" kern="1200" cap="none" spc="0" normalizeH="0" noProof="0" dirty="0" smtClean="0">
+                <a:ln>
+                  <a:noFill/>
+                </a:ln>
+                <a:solidFill>
+                  <a:schemeClr val="tx1"/>
+                </a:solidFill>
+                <a:effectLst/>
+                <a:uLnTx/>
+                <a:uFillTx/>
+                <a:latin typeface="Courier New" pitchFamily="49" charset="0"/>
+                <a:ea typeface="+mn-ea"/>
+                <a:cs typeface="Courier New" pitchFamily="49" charset="0"/>
+              </a:rPr>
+              <a:t> implements </a:t>
+            </a:r>
+            <a:r>
+              <a:rPr kumimoji="0" lang="en-US" sz="1400" b="0" i="0" u="none" strike="noStrike" kern="1200" cap="none" spc="0" normalizeH="0" noProof="0" dirty="0" err="1" smtClean="0">
+                <a:ln>
+                  <a:noFill/>
+                </a:ln>
+                <a:solidFill>
+                  <a:srgbClr val="FF0000"/>
+                </a:solidFill>
+                <a:effectLst/>
+                <a:uLnTx/>
+                <a:uFillTx/>
+                <a:latin typeface="Courier New" pitchFamily="49" charset="0"/>
+                <a:ea typeface="+mn-ea"/>
+                <a:cs typeface="Courier New" pitchFamily="49" charset="0"/>
+              </a:rPr>
+              <a:t>org.quartz.Job</a:t>
+            </a:r>
+            <a:r>
+              <a:rPr kumimoji="0" lang="en-US" sz="1400" b="0" i="0" u="none" strike="noStrike" kern="1200" cap="none" spc="0" normalizeH="0" noProof="0" dirty="0" smtClean="0">
+                <a:ln>
+                  <a:noFill/>
+                </a:ln>
+                <a:solidFill>
+                  <a:schemeClr val="tx1"/>
+                </a:solidFill>
+                <a:effectLst/>
+                <a:uLnTx/>
+                <a:uFillTx/>
+                <a:latin typeface="Courier New" pitchFamily="49" charset="0"/>
+                <a:ea typeface="+mn-ea"/>
+                <a:cs typeface="Courier New" pitchFamily="49" charset="0"/>
+              </a:rPr>
+              <a:t> {</a:t>
+            </a:r>
+          </a:p>
+          <a:p>
+            <a:pPr marL="342900" marR="0" lvl="0" indent="-342900" algn="l" defTabSz="914400" rtl="0" eaLnBrk="1" fontAlgn="auto" latinLnBrk="0" hangingPunct="1">
+              <a:lnSpc>
+                <a:spcPct val="100000"/>
+              </a:lnSpc>
+              <a:spcBef>
+                <a:spcPct val="20000"/>
+              </a:spcBef>
+              <a:spcAft>
+                <a:spcPts val="0"/>
+              </a:spcAft>
+              <a:buClrTx/>
+              <a:buSzTx/>
+              <a:buFont typeface="Arial" pitchFamily="34" charset="0"/>
+              <a:buNone/>
+              <a:tabLst/>
+              <a:defRPr/>
+            </a:pPr>
+            <a:r>
+              <a:rPr lang="en-US" sz="1400" dirty="0" smtClean="0">
+                <a:latin typeface="Courier New" pitchFamily="49" charset="0"/>
+                <a:cs typeface="Courier New" pitchFamily="49" charset="0"/>
+              </a:rPr>
+              <a:t> </a:t>
+            </a:r>
+            <a:r>
+              <a:rPr lang="en-US" sz="1400" dirty="0" smtClean="0">
+                <a:latin typeface="Courier New" pitchFamily="49" charset="0"/>
+                <a:cs typeface="Courier New" pitchFamily="49" charset="0"/>
+              </a:rPr>
+              <a:t> @Override</a:t>
+            </a:r>
+          </a:p>
+          <a:p>
+            <a:pPr marL="342900" marR="0" lvl="0" indent="-342900" algn="l" defTabSz="914400" rtl="0" eaLnBrk="1" fontAlgn="auto" latinLnBrk="0" hangingPunct="1">
+              <a:lnSpc>
+                <a:spcPct val="100000"/>
+              </a:lnSpc>
+              <a:spcBef>
+                <a:spcPct val="20000"/>
+              </a:spcBef>
+              <a:spcAft>
+                <a:spcPts val="0"/>
+              </a:spcAft>
+              <a:buClrTx/>
+              <a:buSzTx/>
+              <a:buFont typeface="Arial" pitchFamily="34" charset="0"/>
+              <a:buNone/>
+              <a:tabLst/>
+              <a:defRPr/>
+            </a:pPr>
+            <a:r>
+              <a:rPr lang="en-US" sz="1400" dirty="0" smtClean="0">
+                <a:latin typeface="Courier New" pitchFamily="49" charset="0"/>
+                <a:cs typeface="Courier New" pitchFamily="49" charset="0"/>
+              </a:rPr>
+              <a:t>  public void execute(</a:t>
+            </a:r>
+            <a:r>
+              <a:rPr lang="en-US" sz="1400" dirty="0" err="1" smtClean="0">
+                <a:latin typeface="Courier New" pitchFamily="49" charset="0"/>
+                <a:cs typeface="Courier New" pitchFamily="49" charset="0"/>
+              </a:rPr>
+              <a:t>JobExecutionContext</a:t>
+            </a:r>
+            <a:r>
+              <a:rPr lang="en-US" sz="1400" dirty="0" smtClean="0">
+                <a:latin typeface="Courier New" pitchFamily="49" charset="0"/>
+                <a:cs typeface="Courier New" pitchFamily="49" charset="0"/>
+              </a:rPr>
+              <a:t> </a:t>
+            </a:r>
+            <a:r>
+              <a:rPr lang="en-US" sz="1400" dirty="0" err="1" smtClean="0">
+                <a:latin typeface="Courier New" pitchFamily="49" charset="0"/>
+                <a:cs typeface="Courier New" pitchFamily="49" charset="0"/>
+              </a:rPr>
+              <a:t>ctx</a:t>
+            </a:r>
+            <a:r>
+              <a:rPr lang="en-US" sz="1400" dirty="0" smtClean="0">
+                <a:latin typeface="Courier New" pitchFamily="49" charset="0"/>
+                <a:cs typeface="Courier New" pitchFamily="49" charset="0"/>
+              </a:rPr>
+              <a:t>) </a:t>
+            </a:r>
+          </a:p>
+          <a:p>
+            <a:pPr marL="342900" marR="0" lvl="0" indent="-342900" algn="l" defTabSz="914400" rtl="0" eaLnBrk="1" fontAlgn="auto" latinLnBrk="0" hangingPunct="1">
+              <a:lnSpc>
+                <a:spcPct val="100000"/>
+              </a:lnSpc>
+              <a:spcBef>
+                <a:spcPct val="20000"/>
+              </a:spcBef>
+              <a:spcAft>
+                <a:spcPts val="0"/>
+              </a:spcAft>
+              <a:buClrTx/>
+              <a:buSzTx/>
+              <a:buFont typeface="Arial" pitchFamily="34" charset="0"/>
+              <a:buNone/>
+              <a:tabLst/>
+              <a:defRPr/>
+            </a:pPr>
+            <a:r>
+              <a:rPr lang="en-US" sz="1400" dirty="0" smtClean="0">
+                <a:latin typeface="Courier New" pitchFamily="49" charset="0"/>
+                <a:cs typeface="Courier New" pitchFamily="49" charset="0"/>
+              </a:rPr>
+              <a:t> </a:t>
+            </a:r>
+            <a:r>
+              <a:rPr lang="en-US" sz="1400" dirty="0" smtClean="0">
+                <a:latin typeface="Courier New" pitchFamily="49" charset="0"/>
+                <a:cs typeface="Courier New" pitchFamily="49" charset="0"/>
+              </a:rPr>
+              <a:t>     throws </a:t>
+            </a:r>
+            <a:r>
+              <a:rPr lang="en-US" sz="1400" dirty="0" err="1" smtClean="0">
+                <a:latin typeface="Courier New" pitchFamily="49" charset="0"/>
+                <a:cs typeface="Courier New" pitchFamily="49" charset="0"/>
+              </a:rPr>
+              <a:t>JobExecutionException</a:t>
+            </a:r>
+            <a:r>
+              <a:rPr lang="en-US" sz="1400" dirty="0" smtClean="0">
+                <a:latin typeface="Courier New" pitchFamily="49" charset="0"/>
+                <a:cs typeface="Courier New" pitchFamily="49" charset="0"/>
+              </a:rPr>
+              <a:t> {</a:t>
+            </a:r>
+          </a:p>
+          <a:p>
+            <a:pPr marL="342900" marR="0" lvl="0" indent="-342900" algn="l" defTabSz="914400" rtl="0" eaLnBrk="1" fontAlgn="auto" latinLnBrk="0" hangingPunct="1">
+              <a:lnSpc>
+                <a:spcPct val="100000"/>
+              </a:lnSpc>
+              <a:spcBef>
+                <a:spcPct val="20000"/>
+              </a:spcBef>
+              <a:spcAft>
+                <a:spcPts val="0"/>
+              </a:spcAft>
+              <a:buClrTx/>
+              <a:buSzTx/>
+              <a:buFont typeface="Arial" pitchFamily="34" charset="0"/>
+              <a:buNone/>
+              <a:tabLst/>
+              <a:defRPr/>
+            </a:pPr>
+            <a:endParaRPr lang="en-US" sz="1400" dirty="0" smtClean="0">
+              <a:latin typeface="Courier New" pitchFamily="49" charset="0"/>
+              <a:cs typeface="Courier New" pitchFamily="49" charset="0"/>
+            </a:endParaRPr>
+          </a:p>
+          <a:p>
+            <a:pPr marL="342900" marR="0" lvl="0" indent="-342900" algn="l" defTabSz="914400" rtl="0" eaLnBrk="1" fontAlgn="auto" latinLnBrk="0" hangingPunct="1">
+              <a:lnSpc>
+                <a:spcPct val="100000"/>
+              </a:lnSpc>
+              <a:spcBef>
+                <a:spcPct val="20000"/>
+              </a:spcBef>
+              <a:spcAft>
+                <a:spcPts val="0"/>
+              </a:spcAft>
+              <a:buClrTx/>
+              <a:buSzTx/>
+              <a:buFont typeface="Arial" pitchFamily="34" charset="0"/>
+              <a:buNone/>
+              <a:tabLst/>
+              <a:defRPr/>
+            </a:pPr>
+            <a:r>
+              <a:rPr lang="en-US" sz="1400" dirty="0" smtClean="0">
+                <a:latin typeface="Courier New" pitchFamily="49" charset="0"/>
+                <a:cs typeface="Courier New" pitchFamily="49" charset="0"/>
+              </a:rPr>
+              <a:t> </a:t>
+            </a:r>
+            <a:r>
+              <a:rPr lang="en-US" sz="1400" dirty="0" smtClean="0">
+                <a:latin typeface="Courier New" pitchFamily="49" charset="0"/>
+                <a:cs typeface="Courier New" pitchFamily="49" charset="0"/>
+              </a:rPr>
+              <a:t>   </a:t>
+            </a:r>
+            <a:r>
+              <a:rPr lang="en-US" sz="1400" dirty="0" err="1" smtClean="0">
+                <a:latin typeface="Courier New" pitchFamily="49" charset="0"/>
+                <a:cs typeface="Courier New" pitchFamily="49" charset="0"/>
+              </a:rPr>
+              <a:t>System.out.println</a:t>
+            </a:r>
+            <a:r>
+              <a:rPr lang="en-US" sz="1400" dirty="0" smtClean="0">
+                <a:latin typeface="Courier New" pitchFamily="49" charset="0"/>
+                <a:cs typeface="Courier New" pitchFamily="49" charset="0"/>
+              </a:rPr>
+              <a:t>(“job is running”);</a:t>
+            </a:r>
+          </a:p>
+          <a:p>
+            <a:pPr marL="342900" marR="0" lvl="0" indent="-342900" algn="l" defTabSz="914400" rtl="0" eaLnBrk="1" fontAlgn="auto" latinLnBrk="0" hangingPunct="1">
+              <a:lnSpc>
+                <a:spcPct val="100000"/>
+              </a:lnSpc>
+              <a:spcBef>
+                <a:spcPct val="20000"/>
+              </a:spcBef>
+              <a:spcAft>
+                <a:spcPts val="0"/>
+              </a:spcAft>
+              <a:buClrTx/>
+              <a:buSzTx/>
+              <a:buFont typeface="Arial" pitchFamily="34" charset="0"/>
+              <a:buNone/>
+              <a:tabLst/>
+              <a:defRPr/>
+            </a:pPr>
+            <a:endParaRPr lang="en-US" sz="1400" dirty="0" smtClean="0">
+              <a:latin typeface="Courier New" pitchFamily="49" charset="0"/>
+              <a:cs typeface="Courier New" pitchFamily="49" charset="0"/>
+            </a:endParaRPr>
+          </a:p>
+          <a:p>
+            <a:pPr marL="342900" marR="0" lvl="0" indent="-342900" algn="l" defTabSz="914400" rtl="0" eaLnBrk="1" fontAlgn="auto" latinLnBrk="0" hangingPunct="1">
+              <a:lnSpc>
+                <a:spcPct val="100000"/>
+              </a:lnSpc>
+              <a:spcBef>
+                <a:spcPct val="20000"/>
+              </a:spcBef>
+              <a:spcAft>
+                <a:spcPts val="0"/>
+              </a:spcAft>
+              <a:buClrTx/>
+              <a:buSzTx/>
+              <a:buFont typeface="Arial" pitchFamily="34" charset="0"/>
+              <a:buNone/>
+              <a:tabLst/>
+              <a:defRPr/>
+            </a:pPr>
+            <a:r>
+              <a:rPr kumimoji="0" lang="en-US" sz="1400" b="0" i="0" u="none" strike="noStrike" kern="1200" cap="none" spc="0" normalizeH="0" noProof="0" dirty="0" smtClean="0">
+                <a:ln>
+                  <a:noFill/>
+                </a:ln>
+                <a:solidFill>
+                  <a:schemeClr val="tx1"/>
+                </a:solidFill>
+                <a:effectLst/>
+                <a:uLnTx/>
+                <a:uFillTx/>
+                <a:latin typeface="Courier New" pitchFamily="49" charset="0"/>
+                <a:ea typeface="+mn-ea"/>
+                <a:cs typeface="Courier New" pitchFamily="49" charset="0"/>
+              </a:rPr>
+              <a:t> </a:t>
+            </a:r>
+            <a:r>
+              <a:rPr kumimoji="0" lang="en-US" sz="1400" b="0" i="0" u="none" strike="noStrike" kern="1200" cap="none" spc="0" normalizeH="0" noProof="0" dirty="0" smtClean="0">
+                <a:ln>
+                  <a:noFill/>
+                </a:ln>
+                <a:solidFill>
+                  <a:schemeClr val="tx1"/>
+                </a:solidFill>
+                <a:effectLst/>
+                <a:uLnTx/>
+                <a:uFillTx/>
+                <a:latin typeface="Courier New" pitchFamily="49" charset="0"/>
+                <a:ea typeface="+mn-ea"/>
+                <a:cs typeface="Courier New" pitchFamily="49" charset="0"/>
+              </a:rPr>
+              <a:t> }</a:t>
+            </a:r>
+          </a:p>
+          <a:p>
+            <a:pPr marL="342900" marR="0" lvl="0" indent="-342900" algn="l" defTabSz="914400" rtl="0" eaLnBrk="1" fontAlgn="auto" latinLnBrk="0" hangingPunct="1">
+              <a:lnSpc>
+                <a:spcPct val="100000"/>
+              </a:lnSpc>
+              <a:spcBef>
+                <a:spcPct val="20000"/>
+              </a:spcBef>
+              <a:spcAft>
+                <a:spcPts val="0"/>
+              </a:spcAft>
+              <a:buClrTx/>
+              <a:buSzTx/>
+              <a:buFont typeface="Arial" pitchFamily="34" charset="0"/>
+              <a:buNone/>
+              <a:tabLst/>
+              <a:defRPr/>
+            </a:pPr>
+            <a:r>
+              <a:rPr kumimoji="0" lang="en-US" sz="1400" b="0" i="0" u="none" strike="noStrike" kern="1200" cap="none" spc="0" normalizeH="0" noProof="0" dirty="0" smtClean="0">
+                <a:ln>
+                  <a:noFill/>
+                </a:ln>
+                <a:solidFill>
+                  <a:schemeClr val="tx1"/>
+                </a:solidFill>
+                <a:effectLst/>
+                <a:uLnTx/>
+                <a:uFillTx/>
+                <a:latin typeface="Courier New" pitchFamily="49" charset="0"/>
+                <a:cs typeface="Courier New" pitchFamily="49" charset="0"/>
+              </a:rPr>
+              <a:t>}</a:t>
+            </a:r>
+            <a:endParaRPr kumimoji="0" lang="en-US" sz="1400" b="0" i="0" u="none" strike="noStrike" kern="1200" cap="none" spc="0" normalizeH="0" baseline="0" noProof="0" dirty="0" smtClean="0">
+              <a:ln>
+                <a:noFill/>
+              </a:ln>
+              <a:solidFill>
+                <a:schemeClr val="tx1"/>
+              </a:solidFill>
+              <a:effectLst/>
+              <a:uLnTx/>
+              <a:uFillTx/>
+              <a:latin typeface="Courier New" pitchFamily="49" charset="0"/>
+              <a:cs typeface="Courier New" pitchFamily="49" charset="0"/>
+            </a:endParaRPr>
           </a:p>
         </p:txBody>
       </p:sp>
@@ -4691,7 +5342,12 @@
             <p:ph type="title"/>
           </p:nvPr>
         </p:nvSpPr>
-        <p:spPr/>
+        <p:spPr>
+          <a:xfrm>
+            <a:off x="457200" y="152400"/>
+            <a:ext cx="8229600" cy="1143000"/>
+          </a:xfrm>
+        </p:spPr>
         <p:txBody>
           <a:bodyPr>
             <a:normAutofit/>
@@ -4716,10 +5372,20 @@
             <p:ph idx="1"/>
           </p:nvPr>
         </p:nvSpPr>
-        <p:spPr/>
+        <p:spPr>
+          <a:xfrm>
+            <a:off x="533400" y="1371600"/>
+            <a:ext cx="8229600" cy="4953000"/>
+          </a:xfrm>
+          <a:ln>
+            <a:solidFill>
+              <a:schemeClr val="tx1"/>
+            </a:solidFill>
+          </a:ln>
+        </p:spPr>
         <p:txBody>
           <a:bodyPr>
-            <a:normAutofit fontScale="92500" lnSpcReduction="10000"/>
+            <a:noAutofit/>
           </a:bodyPr>
           <a:lstStyle/>
           <a:p>
@@ -4727,21 +5393,21 @@
               <a:buNone/>
             </a:pPr>
             <a:r>
-              <a:rPr lang="en-US" sz="1500" dirty="0" smtClean="0">
+              <a:rPr lang="en-US" sz="1400" dirty="0" smtClean="0">
                 <a:latin typeface="Courier New" pitchFamily="49" charset="0"/>
                 <a:cs typeface="Courier New" pitchFamily="49" charset="0"/>
               </a:rPr>
               <a:t>import </a:t>
             </a:r>
             <a:r>
-              <a:rPr lang="en-US" sz="1500" dirty="0" err="1" smtClean="0">
+              <a:rPr lang="en-US" sz="1400" dirty="0" err="1" smtClean="0">
                 <a:latin typeface="Courier New" pitchFamily="49" charset="0"/>
                 <a:cs typeface="Courier New" pitchFamily="49" charset="0"/>
               </a:rPr>
               <a:t>org.quartz.JobDetail</a:t>
             </a:r>
             <a:r>
-              <a:rPr lang="en-US" sz="1500" dirty="0" smtClean="0">
+              <a:rPr lang="en-US" sz="1400" dirty="0" smtClean="0">
                 <a:latin typeface="Courier New" pitchFamily="49" charset="0"/>
                 <a:cs typeface="Courier New" pitchFamily="49" charset="0"/>
               </a:rPr>
@@ -4753,21 +5419,21 @@
               <a:buNone/>
             </a:pPr>
             <a:r>
-              <a:rPr lang="en-US" sz="1500" dirty="0" smtClean="0">
+              <a:rPr lang="en-US" sz="1400" dirty="0" smtClean="0">
                 <a:latin typeface="Courier New" pitchFamily="49" charset="0"/>
                 <a:cs typeface="Courier New" pitchFamily="49" charset="0"/>
               </a:rPr>
               <a:t>import </a:t>
             </a:r>
             <a:r>
-              <a:rPr lang="en-US" sz="1500" dirty="0" err="1" smtClean="0">
+              <a:rPr lang="en-US" sz="1400" dirty="0" err="1" smtClean="0">
                 <a:latin typeface="Courier New" pitchFamily="49" charset="0"/>
                 <a:cs typeface="Courier New" pitchFamily="49" charset="0"/>
               </a:rPr>
               <a:t>org.quartz.Scheduler</a:t>
             </a:r>
             <a:r>
-              <a:rPr lang="en-US" sz="1500" dirty="0" smtClean="0">
+              <a:rPr lang="en-US" sz="1400" dirty="0" smtClean="0">
                 <a:latin typeface="Courier New" pitchFamily="49" charset="0"/>
                 <a:cs typeface="Courier New" pitchFamily="49" charset="0"/>
               </a:rPr>
@@ -4779,21 +5445,21 @@
               <a:buNone/>
             </a:pPr>
             <a:r>
-              <a:rPr lang="en-US" sz="1500" dirty="0" smtClean="0">
+              <a:rPr lang="en-US" sz="1400" dirty="0" smtClean="0">
                 <a:latin typeface="Courier New" pitchFamily="49" charset="0"/>
                 <a:cs typeface="Courier New" pitchFamily="49" charset="0"/>
               </a:rPr>
               <a:t>import </a:t>
             </a:r>
             <a:r>
-              <a:rPr lang="en-US" sz="1500" dirty="0" err="1" smtClean="0">
+              <a:rPr lang="en-US" sz="1400" dirty="0" err="1" smtClean="0">
                 <a:latin typeface="Courier New" pitchFamily="49" charset="0"/>
                 <a:cs typeface="Courier New" pitchFamily="49" charset="0"/>
               </a:rPr>
               <a:t>org.quartz.SimpleTrigger</a:t>
             </a:r>
             <a:r>
-              <a:rPr lang="en-US" sz="1500" dirty="0" smtClean="0">
+              <a:rPr lang="en-US" sz="1400" dirty="0" smtClean="0">
                 <a:latin typeface="Courier New" pitchFamily="49" charset="0"/>
                 <a:cs typeface="Courier New" pitchFamily="49" charset="0"/>
               </a:rPr>
@@ -4805,21 +5471,21 @@
               <a:buNone/>
             </a:pPr>
             <a:r>
-              <a:rPr lang="en-US" sz="1500" dirty="0" smtClean="0">
+              <a:rPr lang="en-US" sz="1400" dirty="0" smtClean="0">
                 <a:latin typeface="Courier New" pitchFamily="49" charset="0"/>
                 <a:cs typeface="Courier New" pitchFamily="49" charset="0"/>
               </a:rPr>
               <a:t>import </a:t>
             </a:r>
             <a:r>
-              <a:rPr lang="en-US" sz="1500" dirty="0" err="1" smtClean="0">
+              <a:rPr lang="en-US" sz="1400" dirty="0" err="1" smtClean="0">
                 <a:latin typeface="Courier New" pitchFamily="49" charset="0"/>
                 <a:cs typeface="Courier New" pitchFamily="49" charset="0"/>
               </a:rPr>
               <a:t>org.quartz.impl.StdSchedulerFactory</a:t>
             </a:r>
             <a:r>
-              <a:rPr lang="en-US" sz="1500" dirty="0" smtClean="0">
+              <a:rPr lang="en-US" sz="1400" dirty="0" smtClean="0">
                 <a:latin typeface="Courier New" pitchFamily="49" charset="0"/>
                 <a:cs typeface="Courier New" pitchFamily="49" charset="0"/>
               </a:rPr>
@@ -4830,7 +5496,7 @@
             <a:pPr>
               <a:buNone/>
             </a:pPr>
-            <a:endParaRPr lang="en-US" sz="1500" dirty="0" smtClean="0">
+            <a:endParaRPr lang="en-US" sz="1400" dirty="0" smtClean="0">
               <a:latin typeface="Courier New" pitchFamily="49" charset="0"/>
               <a:cs typeface="Courier New" pitchFamily="49" charset="0"/>
             </a:endParaRPr>
@@ -4840,21 +5506,21 @@
               <a:buNone/>
             </a:pPr>
             <a:r>
-              <a:rPr lang="en-US" sz="1500" dirty="0" smtClean="0">
+              <a:rPr lang="en-US" sz="1400" dirty="0" smtClean="0">
                 <a:latin typeface="Courier New" pitchFamily="49" charset="0"/>
                 <a:cs typeface="Courier New" pitchFamily="49" charset="0"/>
               </a:rPr>
               <a:t>public class </a:t>
             </a:r>
             <a:r>
-              <a:rPr lang="en-US" sz="1500" dirty="0" err="1" smtClean="0">
+              <a:rPr lang="en-US" sz="1400" dirty="0" err="1" smtClean="0">
                 <a:latin typeface="Courier New" pitchFamily="49" charset="0"/>
                 <a:cs typeface="Courier New" pitchFamily="49" charset="0"/>
               </a:rPr>
               <a:t>QuartzExample</a:t>
             </a:r>
             <a:r>
-              <a:rPr lang="en-US" sz="1500" dirty="0" smtClean="0">
+              <a:rPr lang="en-US" sz="1400" dirty="0" smtClean="0">
                 <a:latin typeface="Courier New" pitchFamily="49" charset="0"/>
                 <a:cs typeface="Courier New" pitchFamily="49" charset="0"/>
               </a:rPr>
@@ -4866,21 +5532,21 @@
               <a:buNone/>
             </a:pPr>
             <a:r>
-              <a:rPr lang="en-US" sz="1500" dirty="0" smtClean="0">
+              <a:rPr lang="en-US" sz="1400" dirty="0" smtClean="0">
                 <a:latin typeface="Courier New" pitchFamily="49" charset="0"/>
                 <a:cs typeface="Courier New" pitchFamily="49" charset="0"/>
               </a:rPr>
               <a:t>  public static void main(String[] </a:t>
             </a:r>
             <a:r>
-              <a:rPr lang="en-US" sz="1500" dirty="0" err="1" smtClean="0">
+              <a:rPr lang="en-US" sz="1400" dirty="0" err="1" smtClean="0">
                 <a:latin typeface="Courier New" pitchFamily="49" charset="0"/>
                 <a:cs typeface="Courier New" pitchFamily="49" charset="0"/>
               </a:rPr>
               <a:t>args</a:t>
             </a:r>
             <a:r>
-              <a:rPr lang="en-US" sz="1500" dirty="0" smtClean="0">
+              <a:rPr lang="en-US" sz="1400" dirty="0" smtClean="0">
                 <a:latin typeface="Courier New" pitchFamily="49" charset="0"/>
                 <a:cs typeface="Courier New" pitchFamily="49" charset="0"/>
               </a:rPr>
@@ -4892,35 +5558,35 @@
               <a:buNone/>
             </a:pPr>
             <a:r>
-              <a:rPr lang="en-US" sz="1500" dirty="0" smtClean="0">
+              <a:rPr lang="en-US" sz="1400" dirty="0" smtClean="0">
                 <a:latin typeface="Courier New" pitchFamily="49" charset="0"/>
                 <a:cs typeface="Courier New" pitchFamily="49" charset="0"/>
               </a:rPr>
               <a:t>    Scheduler </a:t>
             </a:r>
             <a:r>
-              <a:rPr lang="en-US" sz="1500" dirty="0" err="1" smtClean="0">
+              <a:rPr lang="en-US" sz="1400" dirty="0" err="1" smtClean="0">
                 <a:latin typeface="Courier New" pitchFamily="49" charset="0"/>
                 <a:cs typeface="Courier New" pitchFamily="49" charset="0"/>
               </a:rPr>
               <a:t>scheduler</a:t>
             </a:r>
             <a:r>
-              <a:rPr lang="en-US" sz="1500" dirty="0" smtClean="0">
+              <a:rPr lang="en-US" sz="1400" dirty="0" smtClean="0">
                 <a:latin typeface="Courier New" pitchFamily="49" charset="0"/>
                 <a:cs typeface="Courier New" pitchFamily="49" charset="0"/>
               </a:rPr>
               <a:t> = </a:t>
             </a:r>
             <a:r>
-              <a:rPr lang="en-US" sz="1500" dirty="0" err="1" smtClean="0">
+              <a:rPr lang="en-US" sz="1400" dirty="0" err="1" smtClean="0">
                 <a:latin typeface="Courier New" pitchFamily="49" charset="0"/>
                 <a:cs typeface="Courier New" pitchFamily="49" charset="0"/>
               </a:rPr>
               <a:t>StdSchedulerFactory.getDefaultScheduler</a:t>
             </a:r>
             <a:r>
-              <a:rPr lang="en-US" sz="1500" dirty="0" smtClean="0">
+              <a:rPr lang="en-US" sz="1400" dirty="0" smtClean="0">
                 <a:latin typeface="Courier New" pitchFamily="49" charset="0"/>
                 <a:cs typeface="Courier New" pitchFamily="49" charset="0"/>
               </a:rPr>
@@ -4931,7 +5597,7 @@
             <a:pPr>
               <a:buNone/>
             </a:pPr>
-            <a:endParaRPr lang="en-US" sz="1500" dirty="0" smtClean="0">
+            <a:endParaRPr lang="en-US" sz="1400" dirty="0" smtClean="0">
               <a:latin typeface="Courier New" pitchFamily="49" charset="0"/>
               <a:cs typeface="Courier New" pitchFamily="49" charset="0"/>
             </a:endParaRPr>
@@ -4941,49 +5607,49 @@
               <a:buNone/>
             </a:pPr>
             <a:r>
-              <a:rPr lang="en-US" sz="1500" dirty="0" smtClean="0">
+              <a:rPr lang="en-US" sz="1400" dirty="0" smtClean="0">
                 <a:latin typeface="Courier New" pitchFamily="49" charset="0"/>
                 <a:cs typeface="Courier New" pitchFamily="49" charset="0"/>
               </a:rPr>
               <a:t>    </a:t>
             </a:r>
             <a:r>
-              <a:rPr lang="en-US" sz="1500" dirty="0" err="1" smtClean="0">
+              <a:rPr lang="en-US" sz="1400" dirty="0" err="1" smtClean="0">
                 <a:latin typeface="Courier New" pitchFamily="49" charset="0"/>
                 <a:cs typeface="Courier New" pitchFamily="49" charset="0"/>
               </a:rPr>
               <a:t>JobDetail</a:t>
             </a:r>
             <a:r>
-              <a:rPr lang="en-US" sz="1500" dirty="0" smtClean="0">
+              <a:rPr lang="en-US" sz="1400" dirty="0" smtClean="0">
                 <a:latin typeface="Courier New" pitchFamily="49" charset="0"/>
                 <a:cs typeface="Courier New" pitchFamily="49" charset="0"/>
               </a:rPr>
               <a:t> job = new </a:t>
             </a:r>
             <a:r>
-              <a:rPr lang="en-US" sz="1500" dirty="0" err="1" smtClean="0">
+              <a:rPr lang="en-US" sz="1400" dirty="0" err="1" smtClean="0">
                 <a:latin typeface="Courier New" pitchFamily="49" charset="0"/>
                 <a:cs typeface="Courier New" pitchFamily="49" charset="0"/>
               </a:rPr>
               <a:t>JobDetail</a:t>
             </a:r>
             <a:r>
-              <a:rPr lang="en-US" sz="1500" dirty="0" smtClean="0">
+              <a:rPr lang="en-US" sz="1400" dirty="0" smtClean="0">
                 <a:latin typeface="Courier New" pitchFamily="49" charset="0"/>
                 <a:cs typeface="Courier New" pitchFamily="49" charset="0"/>
               </a:rPr>
               <a:t>("job1", </a:t>
             </a:r>
             <a:r>
-              <a:rPr lang="en-US" sz="1500" dirty="0" err="1" smtClean="0">
+              <a:rPr lang="en-US" sz="1400" dirty="0" err="1" smtClean="0">
                 <a:latin typeface="Courier New" pitchFamily="49" charset="0"/>
                 <a:cs typeface="Courier New" pitchFamily="49" charset="0"/>
               </a:rPr>
               <a:t>SimpleJob.class</a:t>
             </a:r>
             <a:r>
-              <a:rPr lang="en-US" sz="1500" dirty="0" smtClean="0">
+              <a:rPr lang="en-US" sz="1400" dirty="0" smtClean="0">
                 <a:latin typeface="Courier New" pitchFamily="49" charset="0"/>
                 <a:cs typeface="Courier New" pitchFamily="49" charset="0"/>
               </a:rPr>
@@ -4995,35 +5661,35 @@
               <a:buNone/>
             </a:pPr>
             <a:r>
-              <a:rPr lang="en-US" sz="1500" dirty="0" smtClean="0">
+              <a:rPr lang="en-US" sz="1400" dirty="0" smtClean="0">
                 <a:latin typeface="Courier New" pitchFamily="49" charset="0"/>
                 <a:cs typeface="Courier New" pitchFamily="49" charset="0"/>
               </a:rPr>
               <a:t>    </a:t>
             </a:r>
             <a:r>
-              <a:rPr lang="en-US" sz="1500" dirty="0" err="1" smtClean="0">
+              <a:rPr lang="en-US" sz="1400" dirty="0" err="1" smtClean="0">
                 <a:latin typeface="Courier New" pitchFamily="49" charset="0"/>
                 <a:cs typeface="Courier New" pitchFamily="49" charset="0"/>
               </a:rPr>
               <a:t>SimpleTrigger</a:t>
             </a:r>
             <a:r>
-              <a:rPr lang="en-US" sz="1500" dirty="0" smtClean="0">
+              <a:rPr lang="en-US" sz="1400" dirty="0" smtClean="0">
                 <a:latin typeface="Courier New" pitchFamily="49" charset="0"/>
                 <a:cs typeface="Courier New" pitchFamily="49" charset="0"/>
               </a:rPr>
               <a:t> trigger = new </a:t>
             </a:r>
             <a:r>
-              <a:rPr lang="en-US" sz="1500" dirty="0" err="1" smtClean="0">
+              <a:rPr lang="en-US" sz="1400" dirty="0" err="1" smtClean="0">
                 <a:latin typeface="Courier New" pitchFamily="49" charset="0"/>
                 <a:cs typeface="Courier New" pitchFamily="49" charset="0"/>
               </a:rPr>
               <a:t>SimpleTrigger</a:t>
             </a:r>
             <a:r>
-              <a:rPr lang="en-US" sz="1500" dirty="0" smtClean="0">
+              <a:rPr lang="en-US" sz="1400" dirty="0" smtClean="0">
                 <a:latin typeface="Courier New" pitchFamily="49" charset="0"/>
                 <a:cs typeface="Courier New" pitchFamily="49" charset="0"/>
               </a:rPr>
@@ -5034,7 +5700,7 @@
             <a:pPr>
               <a:buNone/>
             </a:pPr>
-            <a:endParaRPr lang="en-US" sz="1500" dirty="0" smtClean="0">
+            <a:endParaRPr lang="en-US" sz="1400" dirty="0" smtClean="0">
               <a:latin typeface="Courier New" pitchFamily="49" charset="0"/>
               <a:cs typeface="Courier New" pitchFamily="49" charset="0"/>
             </a:endParaRPr>
@@ -5044,21 +5710,21 @@
               <a:buNone/>
             </a:pPr>
             <a:r>
-              <a:rPr lang="en-US" sz="1500" dirty="0" smtClean="0">
+              <a:rPr lang="en-US" sz="1400" dirty="0" smtClean="0">
                 <a:latin typeface="Courier New" pitchFamily="49" charset="0"/>
                 <a:cs typeface="Courier New" pitchFamily="49" charset="0"/>
               </a:rPr>
               <a:t>    </a:t>
             </a:r>
             <a:r>
-              <a:rPr lang="en-US" sz="1500" dirty="0" err="1" smtClean="0">
+              <a:rPr lang="en-US" sz="1400" dirty="0" err="1" smtClean="0">
                 <a:latin typeface="Courier New" pitchFamily="49" charset="0"/>
                 <a:cs typeface="Courier New" pitchFamily="49" charset="0"/>
               </a:rPr>
               <a:t>scheduler.scheduleJob</a:t>
             </a:r>
             <a:r>
-              <a:rPr lang="en-US" sz="1500" dirty="0" smtClean="0">
+              <a:rPr lang="en-US" sz="1400" dirty="0" smtClean="0">
                 <a:latin typeface="Courier New" pitchFamily="49" charset="0"/>
                 <a:cs typeface="Courier New" pitchFamily="49" charset="0"/>
               </a:rPr>
@@ -5069,7 +5735,7 @@
             <a:pPr>
               <a:buNone/>
             </a:pPr>
-            <a:endParaRPr lang="en-US" sz="1500" dirty="0" smtClean="0">
+            <a:endParaRPr lang="en-US" sz="1400" dirty="0" smtClean="0">
               <a:latin typeface="Courier New" pitchFamily="49" charset="0"/>
               <a:cs typeface="Courier New" pitchFamily="49" charset="0"/>
             </a:endParaRPr>
@@ -5079,21 +5745,21 @@
               <a:buNone/>
             </a:pPr>
             <a:r>
-              <a:rPr lang="en-US" sz="1500" dirty="0" smtClean="0">
+              <a:rPr lang="en-US" sz="1400" dirty="0" smtClean="0">
                 <a:latin typeface="Courier New" pitchFamily="49" charset="0"/>
                 <a:cs typeface="Courier New" pitchFamily="49" charset="0"/>
               </a:rPr>
               <a:t>    </a:t>
             </a:r>
             <a:r>
-              <a:rPr lang="en-US" sz="1500" dirty="0" err="1" smtClean="0">
+              <a:rPr lang="en-US" sz="1400" dirty="0" err="1" smtClean="0">
                 <a:latin typeface="Courier New" pitchFamily="49" charset="0"/>
                 <a:cs typeface="Courier New" pitchFamily="49" charset="0"/>
               </a:rPr>
               <a:t>scheduler.start</a:t>
             </a:r>
             <a:r>
-              <a:rPr lang="en-US" sz="1500" dirty="0" smtClean="0">
+              <a:rPr lang="en-US" sz="1400" dirty="0" smtClean="0">
                 <a:latin typeface="Courier New" pitchFamily="49" charset="0"/>
                 <a:cs typeface="Courier New" pitchFamily="49" charset="0"/>
               </a:rPr>
@@ -5105,21 +5771,21 @@
               <a:buNone/>
             </a:pPr>
             <a:r>
-              <a:rPr lang="en-US" sz="1500" dirty="0" smtClean="0">
+              <a:rPr lang="en-US" sz="1400" dirty="0" smtClean="0">
                 <a:latin typeface="Courier New" pitchFamily="49" charset="0"/>
                 <a:cs typeface="Courier New" pitchFamily="49" charset="0"/>
               </a:rPr>
               <a:t>    </a:t>
             </a:r>
             <a:r>
-              <a:rPr lang="en-US" sz="1500" dirty="0" err="1" smtClean="0">
+              <a:rPr lang="en-US" sz="1400" dirty="0" err="1" smtClean="0">
                 <a:latin typeface="Courier New" pitchFamily="49" charset="0"/>
                 <a:cs typeface="Courier New" pitchFamily="49" charset="0"/>
               </a:rPr>
               <a:t>Thread.sleep</a:t>
             </a:r>
             <a:r>
-              <a:rPr lang="en-US" sz="1500" dirty="0" smtClean="0">
+              <a:rPr lang="en-US" sz="1400" dirty="0" smtClean="0">
                 <a:latin typeface="Courier New" pitchFamily="49" charset="0"/>
                 <a:cs typeface="Courier New" pitchFamily="49" charset="0"/>
               </a:rPr>
@@ -5131,7 +5797,7 @@
               <a:buNone/>
             </a:pPr>
             <a:r>
-              <a:rPr lang="en-US" sz="1500" dirty="0" smtClean="0">
+              <a:rPr lang="en-US" sz="1400" dirty="0" smtClean="0">
                 <a:latin typeface="Courier New" pitchFamily="49" charset="0"/>
                 <a:cs typeface="Courier New" pitchFamily="49" charset="0"/>
               </a:rPr>
@@ -5143,7 +5809,7 @@
               <a:buNone/>
             </a:pPr>
             <a:r>
-              <a:rPr lang="en-US" sz="1500" dirty="0" smtClean="0">
+              <a:rPr lang="en-US" sz="1400" dirty="0" smtClean="0">
                 <a:latin typeface="Courier New" pitchFamily="49" charset="0"/>
                 <a:cs typeface="Courier New" pitchFamily="49" charset="0"/>
               </a:rPr>
@@ -5373,7 +6039,15 @@
           <a:p>
             <a:r>
               <a:rPr lang="en-US" dirty="0" smtClean="0"/>
-              <a:t>Job Storages</a:t>
+              <a:t>Introduction: Quartz 2.0 </a:t>
+            </a:r>
+            <a:r>
+              <a:rPr lang="en-US" dirty="0" err="1" smtClean="0"/>
+              <a:t>vs</a:t>
+            </a:r>
+            <a:r>
+              <a:rPr lang="en-US" dirty="0" smtClean="0"/>
+              <a:t> 1.8</a:t>
             </a:r>
             <a:endParaRPr lang="en-US" dirty="0"/>
           </a:p>
@@ -5398,101 +6072,28 @@
           <a:p>
             <a:r>
               <a:rPr lang="en-US" dirty="0" smtClean="0"/>
-              <a:t>In Memory Job </a:t>
-            </a:r>
-            <a:r>
-              <a:rPr lang="en-US" dirty="0" smtClean="0"/>
-              <a:t>Storage - </a:t>
-            </a:r>
-            <a:r>
-              <a:rPr lang="en-US" dirty="0" err="1" smtClean="0"/>
-              <a:t>RAMJobStore</a:t>
-            </a:r>
-            <a:endParaRPr lang="en-US" dirty="0" smtClean="0"/>
-          </a:p>
-          <a:p>
-            <a:r>
-              <a:rPr lang="en-US" dirty="0" smtClean="0"/>
-              <a:t>JDBC Job </a:t>
-            </a:r>
-            <a:r>
-              <a:rPr lang="en-US" dirty="0" smtClean="0"/>
-              <a:t>Storage - </a:t>
-            </a:r>
-            <a:r>
-              <a:rPr lang="en-US" dirty="0" err="1" smtClean="0"/>
-              <a:t>JobStoreTX</a:t>
-            </a:r>
-            <a:endParaRPr lang="en-US" dirty="0" smtClean="0"/>
-          </a:p>
-          <a:p>
-            <a:r>
-              <a:rPr lang="en-US" dirty="0" err="1" smtClean="0"/>
-              <a:t>T</a:t>
-            </a:r>
-            <a:r>
-              <a:rPr lang="en-US" dirty="0" err="1" smtClean="0"/>
-              <a:t>x</a:t>
-            </a:r>
-            <a:r>
-              <a:rPr lang="en-US" dirty="0" smtClean="0"/>
-              <a:t> </a:t>
-            </a:r>
-            <a:r>
-              <a:rPr lang="en-US" dirty="0" err="1" smtClean="0"/>
-              <a:t>DataSource</a:t>
-            </a:r>
-            <a:r>
-              <a:rPr lang="en-US" dirty="0" smtClean="0"/>
-              <a:t> </a:t>
-            </a:r>
-            <a:r>
-              <a:rPr lang="en-US" dirty="0" smtClean="0"/>
-              <a:t>Job </a:t>
-            </a:r>
-            <a:r>
-              <a:rPr lang="en-US" dirty="0" smtClean="0"/>
-              <a:t>Storage - </a:t>
-            </a:r>
-            <a:r>
-              <a:rPr lang="en-US" dirty="0" err="1" smtClean="0"/>
-              <a:t>JobStoreCMT</a:t>
-            </a:r>
-            <a:endParaRPr lang="en-US" dirty="0" smtClean="0"/>
-          </a:p>
-          <a:p>
-            <a:r>
-              <a:rPr lang="en-US" dirty="0" smtClean="0"/>
-              <a:t>Spring </a:t>
-            </a:r>
-            <a:r>
-              <a:rPr lang="en-US" dirty="0" err="1" smtClean="0"/>
-              <a:t>Tx</a:t>
-            </a:r>
-            <a:r>
-              <a:rPr lang="en-US" dirty="0" smtClean="0"/>
-              <a:t> </a:t>
-            </a:r>
-            <a:r>
-              <a:rPr lang="en-US" dirty="0" err="1" smtClean="0"/>
-              <a:t>DataSource</a:t>
-            </a:r>
-            <a:r>
-              <a:rPr lang="en-US" dirty="0" smtClean="0"/>
-              <a:t> </a:t>
-            </a:r>
-            <a:r>
-              <a:rPr lang="en-US" dirty="0" smtClean="0"/>
-              <a:t>Job </a:t>
-            </a:r>
-            <a:r>
-              <a:rPr lang="en-US" dirty="0" smtClean="0"/>
-              <a:t>Storage - </a:t>
-            </a:r>
-            <a:r>
-              <a:rPr lang="en-US" dirty="0" err="1" smtClean="0"/>
-              <a:t>LocalDataSourceJobStore</a:t>
-            </a:r>
+              <a:t>Released in March 2011</a:t>
+            </a:r>
+          </a:p>
+          <a:p>
+            <a:r>
+              <a:rPr lang="en-US" dirty="0" smtClean="0"/>
+              <a:t>New API</a:t>
+            </a:r>
+          </a:p>
+          <a:p>
+            <a:r>
+              <a:rPr lang="en-US" dirty="0" smtClean="0"/>
+              <a:t>Java DSL for creating jobs</a:t>
+            </a:r>
+          </a:p>
+          <a:p>
+            <a:r>
+              <a:rPr lang="en-US" dirty="0" smtClean="0"/>
+              <a:t>Database schema changes</a:t>
+            </a:r>
+          </a:p>
+          <a:p>
             <a:endParaRPr lang="en-US" dirty="0" smtClean="0"/>
           </a:p>
         </p:txBody>
@@ -5518,6 +6119,37 @@
               <a:t>7</a:t>
             </a:fld>
             <a:endParaRPr lang="en-US"/>
+          </a:p>
+        </p:txBody>
+      </p:sp>
+      <p:sp>
+        <p:nvSpPr>
+          <p:cNvPr id="5" name="TextBox 4"/>
+          <p:cNvSpPr txBox="1"/>
+          <p:nvPr/>
+        </p:nvSpPr>
+        <p:spPr>
+          <a:xfrm>
+            <a:off x="838200" y="5334000"/>
+            <a:ext cx="8001000" cy="381000"/>
+          </a:xfrm>
+          <a:prstGeom prst="rect">
+            <a:avLst/>
+          </a:prstGeom>
+          <a:noFill/>
+        </p:spPr>
+        <p:txBody>
+          <a:bodyPr wrap="square" rtlCol="0">
+            <a:spAutoFit/>
+          </a:bodyPr>
+          <a:lstStyle/>
+          <a:p>
+            <a:pPr algn="ctr"/>
+            <a:r>
+              <a:rPr lang="en-US" dirty="0" smtClean="0"/>
+              <a:t>http://quartz-scheduler.org/docs/2.0/newInQuartz2.html</a:t>
+            </a:r>
+            <a:endParaRPr lang="en-US" dirty="0"/>
           </a:p>
         </p:txBody>
       </p:sp>
@@ -5570,7 +6202,7 @@
           <a:p>
             <a:r>
               <a:rPr lang="en-US" dirty="0" smtClean="0"/>
-              <a:t>Quartz Scheduler Deployment</a:t>
+              <a:t>Job Storages</a:t>
             </a:r>
             <a:endParaRPr lang="en-US" dirty="0"/>
           </a:p>
@@ -5595,38 +6227,74 @@
           <a:p>
             <a:r>
               <a:rPr lang="en-US" dirty="0" smtClean="0"/>
-              <a:t>Standalone single JVM/Quartz scheduler</a:t>
-            </a:r>
-          </a:p>
-          <a:p>
-            <a:r>
-              <a:rPr lang="en-US" dirty="0" smtClean="0"/>
-              <a:t>Server/Client based via RMI registry</a:t>
-            </a:r>
-          </a:p>
-          <a:p>
-            <a:r>
-              <a:rPr lang="en-US" dirty="0" smtClean="0"/>
-              <a:t>Web Container single JVM/Quartz </a:t>
-            </a:r>
-            <a:r>
-              <a:rPr lang="en-US" dirty="0" smtClean="0"/>
-              <a:t>scheduler</a:t>
-            </a:r>
-          </a:p>
-          <a:p>
-            <a:pPr lvl="1"/>
-            <a:r>
-              <a:rPr lang="en-US" dirty="0" smtClean="0"/>
-              <a:t>Allow http client to interact with scheduler!</a:t>
+              <a:t>In Memory Job Storage - </a:t>
+            </a:r>
+            <a:r>
+              <a:rPr lang="en-US" dirty="0" err="1" smtClean="0"/>
+              <a:t>RAMJobStore</a:t>
             </a:r>
             <a:endParaRPr lang="en-US" dirty="0" smtClean="0"/>
           </a:p>
           <a:p>
             <a:r>
               <a:rPr lang="en-US" dirty="0" smtClean="0"/>
-              <a:t>Clustering Quartz scheduler servers</a:t>
-            </a:r>
+              <a:t>JDBC Job Storage - </a:t>
+            </a:r>
+            <a:r>
+              <a:rPr lang="en-US" dirty="0" err="1" smtClean="0"/>
+              <a:t>JobStoreTX</a:t>
+            </a:r>
+            <a:endParaRPr lang="en-US" dirty="0" smtClean="0"/>
+          </a:p>
+          <a:p>
+            <a:r>
+              <a:rPr lang="en-US" dirty="0" err="1" smtClean="0"/>
+              <a:t>Tx</a:t>
+            </a:r>
+            <a:r>
+              <a:rPr lang="en-US" dirty="0" smtClean="0"/>
+              <a:t> </a:t>
+            </a:r>
+            <a:r>
+              <a:rPr lang="en-US" dirty="0" err="1" smtClean="0"/>
+              <a:t>DataSource</a:t>
+            </a:r>
+            <a:r>
+              <a:rPr lang="en-US" dirty="0" smtClean="0"/>
+              <a:t> Job Storage - </a:t>
+            </a:r>
+            <a:r>
+              <a:rPr lang="en-US" dirty="0" err="1" smtClean="0"/>
+              <a:t>JobStoreCMT</a:t>
+            </a:r>
+            <a:endParaRPr lang="en-US" dirty="0" smtClean="0"/>
+          </a:p>
+          <a:p>
+            <a:r>
+              <a:rPr lang="en-US" dirty="0" smtClean="0"/>
+              <a:t>Spring </a:t>
+            </a:r>
+            <a:r>
+              <a:rPr lang="en-US" dirty="0" err="1" smtClean="0"/>
+              <a:t>Tx</a:t>
+            </a:r>
+            <a:r>
+              <a:rPr lang="en-US" dirty="0" smtClean="0"/>
+              <a:t> </a:t>
+            </a:r>
+            <a:r>
+              <a:rPr lang="en-US" dirty="0" err="1" smtClean="0"/>
+              <a:t>DataSource</a:t>
+            </a:r>
+            <a:r>
+              <a:rPr lang="en-US" dirty="0" smtClean="0"/>
+              <a:t> Job Storage - </a:t>
+            </a:r>
+            <a:r>
+              <a:rPr lang="en-US" dirty="0" err="1" smtClean="0"/>
+              <a:t>LocalDataSourceJobStore</a:t>
+            </a:r>
+            <a:endParaRPr lang="en-US" dirty="0" smtClean="0"/>
           </a:p>
         </p:txBody>
       </p:sp>
@@ -5703,7 +6371,7 @@
           <a:p>
             <a:r>
               <a:rPr lang="en-US" dirty="0" smtClean="0"/>
-              <a:t>Scheduler Tips #1</a:t>
+              <a:t>Quartz Scheduler Deployment</a:t>
             </a:r>
             <a:endParaRPr lang="en-US" dirty="0"/>
           </a:p>
@@ -5721,44 +6389,40 @@
         </p:nvSpPr>
         <p:spPr/>
         <p:txBody>
-          <a:bodyPr anchor="ctr">
+          <a:bodyPr>
             <a:normAutofit/>
           </a:bodyPr>
           <a:lstStyle/>
           <a:p>
-            <a:pPr algn="ctr">
-              <a:buNone/>
-            </a:pPr>
-            <a:r>
-              <a:rPr lang="en-US" dirty="0" err="1" smtClean="0"/>
-              <a:t>SimpleTrigger’s</a:t>
-            </a:r>
-            <a:r>
-              <a:rPr lang="en-US" dirty="0" smtClean="0"/>
-              <a:t> </a:t>
-            </a:r>
-          </a:p>
-          <a:p>
-            <a:pPr algn="ctr">
-              <a:buNone/>
-            </a:pPr>
-            <a:r>
-              <a:rPr lang="en-US" dirty="0" err="1" smtClean="0"/>
-              <a:t>repeatCount</a:t>
-            </a:r>
-            <a:r>
-              <a:rPr lang="en-US" dirty="0" smtClean="0"/>
-              <a:t> = Total </a:t>
-            </a:r>
-            <a:r>
-              <a:rPr lang="en-US" dirty="0" smtClean="0"/>
-              <a:t>Run </a:t>
-            </a:r>
-            <a:r>
-              <a:rPr lang="en-US" dirty="0" smtClean="0"/>
-              <a:t>Count + 1</a:t>
-            </a:r>
-            <a:endParaRPr lang="en-US" dirty="0"/>
+            <a:r>
+              <a:rPr lang="en-US" dirty="0" smtClean="0"/>
+              <a:t>Standalone single JVM/Quartz scheduler</a:t>
+            </a:r>
+          </a:p>
+          <a:p>
+            <a:r>
+              <a:rPr lang="en-US" dirty="0" smtClean="0"/>
+              <a:t>Server/Client based via RMI registry</a:t>
+            </a:r>
+          </a:p>
+          <a:p>
+            <a:r>
+              <a:rPr lang="en-US" dirty="0" smtClean="0"/>
+              <a:t>Web Container single JVM/Quartz scheduler</a:t>
+            </a:r>
+          </a:p>
+          <a:p>
+            <a:pPr lvl="1"/>
+            <a:r>
+              <a:rPr lang="en-US" dirty="0" smtClean="0"/>
+              <a:t>Allow http client to interact with scheduler!</a:t>
+            </a:r>
+          </a:p>
+          <a:p>
+            <a:r>
+              <a:rPr lang="en-US" dirty="0" smtClean="0"/>
+              <a:t>Clustering Quartz scheduler servers</a:t>
+            </a:r>
           </a:p>
         </p:txBody>
       </p:sp>

</xml_diff>

<commit_message>
updated Spring datasource with quartz and got cluster example working.
</commit_message>
<xml_diff>
--- a/jug-quartz/JUG-QuartzScheduler.pptx
+++ b/jug-quartz/JUG-QuartzScheduler.pptx
@@ -207,7 +207,7 @@
             <a:fld id="{8AB11769-0C79-44AF-972A-3F5B927E1D64}" type="datetimeFigureOut">
               <a:rPr lang="en-US" smtClean="0"/>
               <a:pPr/>
-              <a:t>05/24/2011</a:t>
+              <a:t>05/26/2011</a:t>
             </a:fld>
             <a:endParaRPr lang="en-US"/>
           </a:p>
@@ -655,7 +655,7 @@
             <a:fld id="{3796407A-8687-4B8F-91F1-3AC1438651FB}" type="datetime1">
               <a:rPr lang="en-US" smtClean="0"/>
               <a:pPr/>
-              <a:t>05/24/2011</a:t>
+              <a:t>05/26/2011</a:t>
             </a:fld>
             <a:endParaRPr lang="en-US"/>
           </a:p>
@@ -822,7 +822,7 @@
             <a:fld id="{E5D373EA-8CA6-4B9B-9005-D717EF56EED0}" type="datetime1">
               <a:rPr lang="en-US" smtClean="0"/>
               <a:pPr/>
-              <a:t>05/24/2011</a:t>
+              <a:t>05/26/2011</a:t>
             </a:fld>
             <a:endParaRPr lang="en-US"/>
           </a:p>
@@ -999,7 +999,7 @@
             <a:fld id="{CF93068E-8064-4FF6-84D5-DB3803DB548E}" type="datetime1">
               <a:rPr lang="en-US" smtClean="0"/>
               <a:pPr/>
-              <a:t>05/24/2011</a:t>
+              <a:t>05/26/2011</a:t>
             </a:fld>
             <a:endParaRPr lang="en-US"/>
           </a:p>
@@ -1166,7 +1166,7 @@
             <a:fld id="{04D0F31D-9398-49EF-B43D-5AB5D9EC9D79}" type="datetime1">
               <a:rPr lang="en-US" smtClean="0"/>
               <a:pPr/>
-              <a:t>05/24/2011</a:t>
+              <a:t>05/26/2011</a:t>
             </a:fld>
             <a:endParaRPr lang="en-US"/>
           </a:p>
@@ -1409,7 +1409,7 @@
             <a:fld id="{2541B562-DB49-478B-9024-3A2F560D2B45}" type="datetime1">
               <a:rPr lang="en-US" smtClean="0"/>
               <a:pPr/>
-              <a:t>05/24/2011</a:t>
+              <a:t>05/26/2011</a:t>
             </a:fld>
             <a:endParaRPr lang="en-US"/>
           </a:p>
@@ -1694,7 +1694,7 @@
             <a:fld id="{C19490BC-31BD-41A3-A766-9A4E2E48CCA6}" type="datetime1">
               <a:rPr lang="en-US" smtClean="0"/>
               <a:pPr/>
-              <a:t>05/24/2011</a:t>
+              <a:t>05/26/2011</a:t>
             </a:fld>
             <a:endParaRPr lang="en-US"/>
           </a:p>
@@ -2113,7 +2113,7 @@
             <a:fld id="{A405D5C5-86E5-45B4-B053-E8D2C54A68DB}" type="datetime1">
               <a:rPr lang="en-US" smtClean="0"/>
               <a:pPr/>
-              <a:t>05/24/2011</a:t>
+              <a:t>05/26/2011</a:t>
             </a:fld>
             <a:endParaRPr lang="en-US"/>
           </a:p>
@@ -2228,7 +2228,7 @@
             <a:fld id="{C07B2446-96F0-44EF-846E-EFDA9C18662A}" type="datetime1">
               <a:rPr lang="en-US" smtClean="0"/>
               <a:pPr/>
-              <a:t>05/24/2011</a:t>
+              <a:t>05/26/2011</a:t>
             </a:fld>
             <a:endParaRPr lang="en-US"/>
           </a:p>
@@ -2320,7 +2320,7 @@
             <a:fld id="{109D3FB2-2BEE-4EB1-A67F-5819A21CEA98}" type="datetime1">
               <a:rPr lang="en-US" smtClean="0"/>
               <a:pPr/>
-              <a:t>05/24/2011</a:t>
+              <a:t>05/26/2011</a:t>
             </a:fld>
             <a:endParaRPr lang="en-US"/>
           </a:p>
@@ -2594,7 +2594,7 @@
             <a:fld id="{4742629B-6F0B-4137-9387-BA5E63C3590B}" type="datetime1">
               <a:rPr lang="en-US" smtClean="0"/>
               <a:pPr/>
-              <a:t>05/24/2011</a:t>
+              <a:t>05/26/2011</a:t>
             </a:fld>
             <a:endParaRPr lang="en-US"/>
           </a:p>
@@ -2844,7 +2844,7 @@
             <a:fld id="{4630A119-7BA1-4517-80A6-CAB5B4E035B4}" type="datetime1">
               <a:rPr lang="en-US" smtClean="0"/>
               <a:pPr/>
-              <a:t>05/24/2011</a:t>
+              <a:t>05/26/2011</a:t>
             </a:fld>
             <a:endParaRPr lang="en-US"/>
           </a:p>
@@ -3054,7 +3054,7 @@
             <a:fld id="{F554EC9A-6C8D-49D6-A5DB-D993F2740181}" type="datetime1">
               <a:rPr lang="en-US" smtClean="0"/>
               <a:pPr/>
-              <a:t>05/24/2011</a:t>
+              <a:t>05/26/2011</a:t>
             </a:fld>
             <a:endParaRPr lang="en-US"/>
           </a:p>
@@ -3456,8 +3456,51 @@
               <a:rPr lang="en-US" dirty="0" smtClean="0"/>
             </a:br>
             <a:r>
+              <a:rPr lang="en-US" sz="2000" dirty="0" smtClean="0">
+                <a:hlinkClick r:id="rId2"/>
+              </a:rPr>
+              <a:t>http://</a:t>
+            </a:r>
+            <a:r>
+              <a:rPr lang="en-US" sz="2000" dirty="0" smtClean="0">
+                <a:hlinkClick r:id="rId2"/>
+              </a:rPr>
+              <a:t>quartz-scheduler.org</a:t>
+            </a:r>
+            <a:r>
               <a:rPr lang="en-US" sz="2000" dirty="0" smtClean="0"/>
-              <a:t>http://quartz-scheduler.org</a:t>
+              <a:t/>
+            </a:r>
+            <a:br>
+              <a:rPr lang="en-US" sz="2000" dirty="0" smtClean="0"/>
+            </a:br>
+            <a:r>
+              <a:rPr lang="en-US" sz="2000" dirty="0" smtClean="0"/>
+              <a:t/>
+            </a:r>
+            <a:br>
+              <a:rPr lang="en-US" sz="2000" dirty="0" smtClean="0"/>
+            </a:br>
+            <a:r>
+              <a:rPr lang="en-US" sz="2000" dirty="0" smtClean="0"/>
+              <a:t>Demo Code</a:t>
+            </a:r>
+            <a:br>
+              <a:rPr lang="en-US" sz="2000" dirty="0" smtClean="0"/>
+            </a:br>
+            <a:r>
+              <a:rPr lang="en-US" sz="2000" dirty="0" smtClean="0"/>
+              <a:t>(</a:t>
+            </a:r>
+            <a:r>
+              <a:rPr lang="en-US" sz="2000" dirty="0" smtClean="0">
+                <a:hlinkClick r:id="rId3"/>
+              </a:rPr>
+              <a:t>http://myschedule.googlecode.com</a:t>
+            </a:r>
+            <a:r>
+              <a:rPr lang="en-US" sz="2000" dirty="0" smtClean="0"/>
+              <a:t>)</a:t>
             </a:r>
             <a:endParaRPr lang="en-US" sz="2000" dirty="0"/>
           </a:p>
@@ -3798,11 +3841,7 @@
           <a:p>
             <a:r>
               <a:rPr lang="en-US" dirty="0" smtClean="0"/>
-              <a:t>Day-Of-Week starts with </a:t>
-            </a:r>
-            <a:r>
-              <a:rPr lang="en-US" dirty="0" smtClean="0"/>
-              <a:t>1=SUN</a:t>
+              <a:t>Day-Of-Week starts with 1=SUN</a:t>
             </a:r>
           </a:p>
           <a:p>
@@ -3810,7 +3849,6 @@
               <a:rPr lang="en-US" dirty="0" smtClean="0"/>
               <a:t>You are allow only one Nth day-of-week (‘#’).</a:t>
             </a:r>
-            <a:endParaRPr lang="en-US" dirty="0" smtClean="0"/>
           </a:p>
         </p:txBody>
       </p:sp>
@@ -4145,15 +4183,7 @@
             </a:r>
             <a:r>
               <a:rPr lang="en-US" dirty="0" smtClean="0"/>
-              <a:t> can</a:t>
-            </a:r>
-            <a:r>
-              <a:rPr lang="en-US" dirty="0" smtClean="0"/>
-              <a:t> partake </a:t>
-            </a:r>
-            <a:r>
-              <a:rPr lang="en-US" dirty="0" smtClean="0"/>
-              <a:t>Spring </a:t>
+              <a:t> can partake Spring </a:t>
             </a:r>
             <a:r>
               <a:rPr lang="en-US" dirty="0" err="1" smtClean="0"/>
@@ -4168,11 +4198,26 @@
             <a:pPr lvl="1"/>
             <a:r>
               <a:rPr lang="en-US" dirty="0" smtClean="0"/>
-              <a:t>Job may have access to Spring App Context through the Scheduler’s Context </a:t>
-            </a:r>
-            <a:r>
-              <a:rPr lang="en-US" smtClean="0"/>
-              <a:t>space.</a:t>
+              <a:t>Job may have access to Spring App Context through the Scheduler’s Context space</a:t>
+            </a:r>
+            <a:r>
+              <a:rPr lang="en-US" dirty="0" smtClean="0"/>
+              <a:t>.</a:t>
+            </a:r>
+          </a:p>
+          <a:p>
+            <a:pPr lvl="1"/>
+            <a:r>
+              <a:rPr lang="en-US" dirty="0" smtClean="0"/>
+              <a:t>Spring 3.0.5 is </a:t>
+            </a:r>
+            <a:r>
+              <a:rPr lang="en-US" smtClean="0"/>
+              <a:t>compatible only up to </a:t>
+            </a:r>
+            <a:r>
+              <a:rPr lang="en-US" dirty="0" smtClean="0"/>
+              <a:t>quartz-1.7.x</a:t>
             </a:r>
             <a:endParaRPr lang="en-US" dirty="0" smtClean="0"/>
           </a:p>
@@ -4993,14 +5038,7 @@
                 <a:latin typeface="Courier New" pitchFamily="49" charset="0"/>
                 <a:cs typeface="Courier New" pitchFamily="49" charset="0"/>
               </a:rPr>
-              <a:t> </a:t>
-            </a:r>
-            <a:r>
-              <a:rPr lang="en-US" sz="1400" dirty="0" smtClean="0">
-                <a:latin typeface="Courier New" pitchFamily="49" charset="0"/>
-                <a:cs typeface="Courier New" pitchFamily="49" charset="0"/>
-              </a:rPr>
-              <a:t> @Override</a:t>
+              <a:t>  @Override</a:t>
             </a:r>
           </a:p>
           <a:p>
@@ -5080,14 +5118,7 @@
                 <a:latin typeface="Courier New" pitchFamily="49" charset="0"/>
                 <a:cs typeface="Courier New" pitchFamily="49" charset="0"/>
               </a:rPr>
-              <a:t> </a:t>
-            </a:r>
-            <a:r>
-              <a:rPr lang="en-US" sz="1400" dirty="0" smtClean="0">
-                <a:latin typeface="Courier New" pitchFamily="49" charset="0"/>
-                <a:cs typeface="Courier New" pitchFamily="49" charset="0"/>
-              </a:rPr>
-              <a:t>     throws </a:t>
+              <a:t>      throws </a:t>
             </a:r>
             <a:r>
               <a:rPr lang="en-US" sz="1400" dirty="0" err="1" smtClean="0">
@@ -5150,14 +5181,7 @@
                 <a:latin typeface="Courier New" pitchFamily="49" charset="0"/>
                 <a:cs typeface="Courier New" pitchFamily="49" charset="0"/>
               </a:rPr>
-              <a:t> </a:t>
-            </a:r>
-            <a:r>
-              <a:rPr lang="en-US" sz="1400" dirty="0" smtClean="0">
-                <a:latin typeface="Courier New" pitchFamily="49" charset="0"/>
-                <a:cs typeface="Courier New" pitchFamily="49" charset="0"/>
-              </a:rPr>
-              <a:t>   </a:t>
+              <a:t>    </a:t>
             </a:r>
             <a:r>
               <a:rPr lang="en-US" sz="1400" dirty="0" err="1" smtClean="0">
@@ -5230,24 +5254,7 @@
                 <a:ea typeface="+mn-ea"/>
                 <a:cs typeface="Courier New" pitchFamily="49" charset="0"/>
               </a:rPr>
-              <a:t> </a:t>
-            </a:r>
-            <a:r>
-              <a:rPr kumimoji="0" lang="en-US" sz="1400" b="0" i="0" u="none" strike="noStrike" kern="1200" cap="none" spc="0" normalizeH="0" noProof="0" dirty="0" smtClean="0">
-                <a:ln>
-                  <a:noFill/>
-                </a:ln>
-                <a:solidFill>
-                  <a:schemeClr val="tx1"/>
-                </a:solidFill>
-                <a:effectLst/>
-                <a:uLnTx/>
-                <a:uFillTx/>
-                <a:latin typeface="Courier New" pitchFamily="49" charset="0"/>
-                <a:ea typeface="+mn-ea"/>
-                <a:cs typeface="Courier New" pitchFamily="49" charset="0"/>
-              </a:rPr>
-              <a:t> }</a:t>
+              <a:t>  }</a:t>
             </a:r>
           </a:p>
           <a:p>

</xml_diff>